<commit_message>
fix: alterações javascript arquivos
</commit_message>
<xml_diff>
--- a/Slides/Javascript/DOM e Eventos.pptx
+++ b/Slides/Javascript/DOM e Eventos.pptx
@@ -19,30 +19,31 @@
     <p:sldId id="294" r:id="rId12"/>
     <p:sldId id="295" r:id="rId13"/>
     <p:sldId id="296" r:id="rId14"/>
-    <p:sldId id="297" r:id="rId15"/>
-    <p:sldId id="298" r:id="rId16"/>
-    <p:sldId id="299" r:id="rId17"/>
-    <p:sldId id="300" r:id="rId18"/>
-    <p:sldId id="301" r:id="rId19"/>
-    <p:sldId id="260" r:id="rId20"/>
-    <p:sldId id="261" r:id="rId21"/>
-    <p:sldId id="291" r:id="rId22"/>
-    <p:sldId id="262" r:id="rId23"/>
-    <p:sldId id="277" r:id="rId24"/>
-    <p:sldId id="273" r:id="rId25"/>
-    <p:sldId id="275" r:id="rId26"/>
-    <p:sldId id="272" r:id="rId27"/>
-    <p:sldId id="276" r:id="rId28"/>
-    <p:sldId id="267" r:id="rId29"/>
-    <p:sldId id="271" r:id="rId30"/>
-    <p:sldId id="269" r:id="rId31"/>
-    <p:sldId id="278" r:id="rId32"/>
-    <p:sldId id="292" r:id="rId33"/>
-    <p:sldId id="279" r:id="rId34"/>
-    <p:sldId id="263" r:id="rId35"/>
-    <p:sldId id="280" r:id="rId36"/>
-    <p:sldId id="281" r:id="rId37"/>
-    <p:sldId id="282" r:id="rId38"/>
+    <p:sldId id="321" r:id="rId15"/>
+    <p:sldId id="297" r:id="rId16"/>
+    <p:sldId id="298" r:id="rId17"/>
+    <p:sldId id="299" r:id="rId18"/>
+    <p:sldId id="300" r:id="rId19"/>
+    <p:sldId id="301" r:id="rId20"/>
+    <p:sldId id="260" r:id="rId21"/>
+    <p:sldId id="261" r:id="rId22"/>
+    <p:sldId id="291" r:id="rId23"/>
+    <p:sldId id="262" r:id="rId24"/>
+    <p:sldId id="277" r:id="rId25"/>
+    <p:sldId id="273" r:id="rId26"/>
+    <p:sldId id="275" r:id="rId27"/>
+    <p:sldId id="272" r:id="rId28"/>
+    <p:sldId id="276" r:id="rId29"/>
+    <p:sldId id="267" r:id="rId30"/>
+    <p:sldId id="271" r:id="rId31"/>
+    <p:sldId id="269" r:id="rId32"/>
+    <p:sldId id="278" r:id="rId33"/>
+    <p:sldId id="292" r:id="rId34"/>
+    <p:sldId id="279" r:id="rId35"/>
+    <p:sldId id="263" r:id="rId36"/>
+    <p:sldId id="280" r:id="rId37"/>
+    <p:sldId id="281" r:id="rId38"/>
+    <p:sldId id="282" r:id="rId39"/>
   </p:sldIdLst>
   <p:sldSz cx="9144000" cy="6858000" type="screen4x3"/>
   <p:notesSz cx="6858000" cy="9144000"/>
@@ -5612,17 +5613,11 @@
         <p:txBody>
           <a:bodyPr/>
           <a:p>
-            <a:br>
-              <a:rPr lang="en-US" altLang="pt-BR"/>
-            </a:br>
-            <a:r>
-              <a:rPr lang="en-US" altLang="pt-BR"/>
-              <a:t>Adicionando elementos em loops</a:t>
-            </a:r>
-            <a:br>
-              <a:rPr lang="en-US" altLang="pt-BR"/>
-            </a:br>
-            <a:endParaRPr lang="en-US" altLang="pt-BR"/>
+            <a:r>
+              <a:rPr lang="pt-BR" altLang="en-US"/>
+              <a:t>Atividade</a:t>
+            </a:r>
+            <a:endParaRPr lang="pt-BR" altLang="en-US"/>
           </a:p>
         </p:txBody>
       </p:sp>
@@ -5640,20 +5635,41 @@
         <p:txBody>
           <a:bodyPr/>
           <a:p>
-            <a:r>
-              <a:rPr lang="" altLang="en-US"/>
-              <a:t>É</a:t>
-            </a:r>
-            <a:r>
-              <a:rPr lang="en-US" altLang="pt-BR"/>
-              <a:t> comum usar createElement e appendChild para criar listas ou elementos repetidos.</a:t>
-            </a:r>
-            <a:endParaRPr lang="en-US" altLang="pt-BR"/>
-          </a:p>
-          <a:p>
-            <a:endParaRPr lang="en-US" altLang="pt-BR"/>
-          </a:p>
-          <a:p>
+            <a:pPr marL="0" indent="0">
+              <a:buNone/>
+            </a:pPr>
+            <a:r>
+              <a:rPr lang="pt-BR" altLang="en-US"/>
+              <a:t>Pesquise outros </a:t>
+            </a:r>
+            <a:r>
+              <a:rPr lang="en-US" altLang="pt-BR"/>
+              <a:t>M</a:t>
+            </a:r>
+            <a:r>
+              <a:rPr lang="en-US" altLang="en-US"/>
+              <a:t>é</a:t>
+            </a:r>
+            <a:r>
+              <a:rPr lang="en-US" altLang="pt-BR"/>
+              <a:t>todos e Propriedades do DOM</a:t>
+            </a:r>
+            <a:r>
+              <a:rPr lang="pt-BR" altLang="en-US"/>
+              <a:t> como o </a:t>
+            </a:r>
+            <a:r>
+              <a:rPr lang="en-US" altLang="pt-BR">
+                <a:sym typeface="+mn-ea"/>
+              </a:rPr>
+              <a:t>parent.firstChild</a:t>
+            </a:r>
+            <a:endParaRPr lang="en-US" altLang="pt-BR"/>
+          </a:p>
+          <a:p>
+            <a:pPr marL="0" indent="0">
+              <a:buNone/>
+            </a:pPr>
             <a:endParaRPr lang="en-US" altLang="pt-BR"/>
           </a:p>
         </p:txBody>
@@ -5690,11 +5706,17 @@
         <p:txBody>
           <a:bodyPr/>
           <a:p>
-            <a:r>
-              <a:rPr lang="pt-BR" altLang="en-US"/>
-              <a:t>Exemplo</a:t>
-            </a:r>
-            <a:endParaRPr lang="pt-BR" altLang="en-US"/>
+            <a:br>
+              <a:rPr lang="en-US" altLang="pt-BR"/>
+            </a:br>
+            <a:r>
+              <a:rPr lang="en-US" altLang="pt-BR"/>
+              <a:t>Adicionando elementos em loops</a:t>
+            </a:r>
+            <a:br>
+              <a:rPr lang="en-US" altLang="pt-BR"/>
+            </a:br>
+            <a:endParaRPr lang="en-US" altLang="pt-BR"/>
           </a:p>
         </p:txBody>
       </p:sp>
@@ -5712,85 +5734,20 @@
         <p:txBody>
           <a:bodyPr/>
           <a:p>
-            <a:pPr marL="0" indent="0">
-              <a:buNone/>
-            </a:pPr>
-            <a:r>
-              <a:rPr lang="en-US" altLang="pt-BR"/>
-              <a:t>const lista = document.createElement("ul");</a:t>
-            </a:r>
-            <a:endParaRPr lang="en-US" altLang="pt-BR"/>
-          </a:p>
-          <a:p>
-            <a:pPr marL="0" indent="0">
-              <a:buNone/>
-            </a:pPr>
-            <a:endParaRPr lang="en-US" altLang="pt-BR"/>
-          </a:p>
-          <a:p>
-            <a:pPr marL="0" indent="0">
-              <a:buNone/>
-            </a:pPr>
-            <a:r>
-              <a:rPr lang="en-US" altLang="pt-BR"/>
-              <a:t>for (let i = 1; i &lt;= 5; i++) {</a:t>
-            </a:r>
-            <a:endParaRPr lang="en-US" altLang="pt-BR"/>
-          </a:p>
-          <a:p>
-            <a:pPr marL="0" indent="0">
-              <a:buNone/>
-            </a:pPr>
-            <a:r>
-              <a:rPr lang="en-US" altLang="pt-BR"/>
-              <a:t>  const item = document.createElement("li");</a:t>
-            </a:r>
-            <a:endParaRPr lang="en-US" altLang="pt-BR"/>
-          </a:p>
-          <a:p>
-            <a:pPr marL="0" indent="0">
-              <a:buNone/>
-            </a:pPr>
-            <a:r>
-              <a:rPr lang="en-US" altLang="pt-BR"/>
-              <a:t>  item.textContent = `Item ${i}`;</a:t>
-            </a:r>
-            <a:endParaRPr lang="en-US" altLang="pt-BR"/>
-          </a:p>
-          <a:p>
-            <a:pPr marL="0" indent="0">
-              <a:buNone/>
-            </a:pPr>
-            <a:r>
-              <a:rPr lang="en-US" altLang="pt-BR"/>
-              <a:t>  lista.appendChild(item);</a:t>
-            </a:r>
-            <a:endParaRPr lang="en-US" altLang="pt-BR"/>
-          </a:p>
-          <a:p>
-            <a:pPr marL="0" indent="0">
-              <a:buNone/>
-            </a:pPr>
-            <a:r>
-              <a:rPr lang="en-US" altLang="pt-BR"/>
-              <a:t>}</a:t>
-            </a:r>
-            <a:endParaRPr lang="en-US" altLang="pt-BR"/>
-          </a:p>
-          <a:p>
-            <a:pPr marL="0" indent="0">
-              <a:buNone/>
-            </a:pPr>
-            <a:r>
-              <a:rPr lang="en-US" altLang="pt-BR"/>
-              <a:t>document.body.appendChild(lista);</a:t>
-            </a:r>
-            <a:endParaRPr lang="en-US" altLang="pt-BR"/>
-          </a:p>
-          <a:p>
-            <a:pPr marL="0" indent="0">
-              <a:buNone/>
-            </a:pPr>
+            <a:r>
+              <a:rPr lang="en-US" altLang="en-US"/>
+              <a:t>É</a:t>
+            </a:r>
+            <a:r>
+              <a:rPr lang="en-US" altLang="pt-BR"/>
+              <a:t> comum usar createElement e appendChild para criar listas ou elementos repetidos.</a:t>
+            </a:r>
+            <a:endParaRPr lang="en-US" altLang="pt-BR"/>
+          </a:p>
+          <a:p>
+            <a:endParaRPr lang="en-US" altLang="pt-BR"/>
+          </a:p>
+          <a:p>
             <a:endParaRPr lang="en-US" altLang="pt-BR"/>
           </a:p>
         </p:txBody>
@@ -5829,7 +5786,7 @@
           <a:p>
             <a:r>
               <a:rPr lang="pt-BR" altLang="en-US"/>
-              <a:t>Resultado</a:t>
+              <a:t>Exemplo</a:t>
             </a:r>
             <a:endParaRPr lang="pt-BR" altLang="en-US"/>
           </a:p>
@@ -5854,67 +5811,73 @@
             </a:pPr>
             <a:r>
               <a:rPr lang="en-US" altLang="pt-BR"/>
-              <a:t>&lt;ul&gt;</a:t>
-            </a:r>
-            <a:endParaRPr lang="en-US" altLang="pt-BR"/>
-          </a:p>
-          <a:p>
-            <a:pPr marL="0" indent="0">
-              <a:buNone/>
-            </a:pPr>
-            <a:r>
-              <a:rPr lang="en-US" altLang="pt-BR"/>
-              <a:t>  &lt;li&gt;Item 1&lt;/li&gt;</a:t>
-            </a:r>
-            <a:endParaRPr lang="en-US" altLang="pt-BR"/>
-          </a:p>
-          <a:p>
-            <a:pPr marL="0" indent="0">
-              <a:buNone/>
-            </a:pPr>
-            <a:r>
-              <a:rPr lang="en-US" altLang="pt-BR"/>
-              <a:t>  &lt;li&gt;Item 2&lt;/li&gt;</a:t>
-            </a:r>
-            <a:endParaRPr lang="en-US" altLang="pt-BR"/>
-          </a:p>
-          <a:p>
-            <a:pPr marL="0" indent="0">
-              <a:buNone/>
-            </a:pPr>
-            <a:r>
-              <a:rPr lang="en-US" altLang="pt-BR"/>
-              <a:t>  &lt;li&gt;Item 3&lt;/li&gt;</a:t>
-            </a:r>
-            <a:endParaRPr lang="en-US" altLang="pt-BR"/>
-          </a:p>
-          <a:p>
-            <a:pPr marL="0" indent="0">
-              <a:buNone/>
-            </a:pPr>
-            <a:r>
-              <a:rPr lang="en-US" altLang="pt-BR"/>
-              <a:t>  &lt;li&gt;Item 4&lt;/li&gt;</a:t>
-            </a:r>
-            <a:endParaRPr lang="en-US" altLang="pt-BR"/>
-          </a:p>
-          <a:p>
-            <a:pPr marL="0" indent="0">
-              <a:buNone/>
-            </a:pPr>
-            <a:r>
-              <a:rPr lang="en-US" altLang="pt-BR"/>
-              <a:t>  &lt;li&gt;Item 5&lt;/li&gt;</a:t>
-            </a:r>
-            <a:endParaRPr lang="en-US" altLang="pt-BR"/>
-          </a:p>
-          <a:p>
-            <a:pPr marL="0" indent="0">
-              <a:buNone/>
-            </a:pPr>
-            <a:r>
-              <a:rPr lang="en-US" altLang="pt-BR"/>
-              <a:t>&lt;/ul&gt;</a:t>
+              <a:t>const lista = document.createElement("ul");</a:t>
+            </a:r>
+            <a:endParaRPr lang="en-US" altLang="pt-BR"/>
+          </a:p>
+          <a:p>
+            <a:pPr marL="0" indent="0">
+              <a:buNone/>
+            </a:pPr>
+            <a:endParaRPr lang="en-US" altLang="pt-BR"/>
+          </a:p>
+          <a:p>
+            <a:pPr marL="0" indent="0">
+              <a:buNone/>
+            </a:pPr>
+            <a:r>
+              <a:rPr lang="en-US" altLang="pt-BR"/>
+              <a:t>for (let i = 1; i &lt;= 5; i++) {</a:t>
+            </a:r>
+            <a:endParaRPr lang="en-US" altLang="pt-BR"/>
+          </a:p>
+          <a:p>
+            <a:pPr marL="0" indent="0">
+              <a:buNone/>
+            </a:pPr>
+            <a:r>
+              <a:rPr lang="en-US" altLang="pt-BR"/>
+              <a:t>  const item = document.createElement("li");</a:t>
+            </a:r>
+            <a:endParaRPr lang="en-US" altLang="pt-BR"/>
+          </a:p>
+          <a:p>
+            <a:pPr marL="0" indent="0">
+              <a:buNone/>
+            </a:pPr>
+            <a:r>
+              <a:rPr lang="en-US" altLang="pt-BR"/>
+              <a:t>  item.textContent = `Item ${i}`;</a:t>
+            </a:r>
+            <a:endParaRPr lang="en-US" altLang="pt-BR"/>
+          </a:p>
+          <a:p>
+            <a:pPr marL="0" indent="0">
+              <a:buNone/>
+            </a:pPr>
+            <a:r>
+              <a:rPr lang="en-US" altLang="pt-BR"/>
+              <a:t>  lista.appendChild(item);</a:t>
+            </a:r>
+            <a:endParaRPr lang="en-US" altLang="pt-BR"/>
+          </a:p>
+          <a:p>
+            <a:pPr marL="0" indent="0">
+              <a:buNone/>
+            </a:pPr>
+            <a:r>
+              <a:rPr lang="en-US" altLang="pt-BR"/>
+              <a:t>}</a:t>
+            </a:r>
+            <a:endParaRPr lang="en-US" altLang="pt-BR"/>
+          </a:p>
+          <a:p>
+            <a:pPr marL="0" indent="0">
+              <a:buNone/>
+            </a:pPr>
+            <a:r>
+              <a:rPr lang="en-US" altLang="pt-BR"/>
+              <a:t>document.body.appendChild(lista);</a:t>
             </a:r>
             <a:endParaRPr lang="en-US" altLang="pt-BR"/>
           </a:p>
@@ -5960,20 +5923,18 @@
           <a:p>
             <a:r>
               <a:rPr lang="pt-BR" altLang="en-US"/>
-              <a:t>R</a:t>
-            </a:r>
-            <a:r>
-              <a:rPr lang="en-US" altLang="pt-BR"/>
-              <a:t>emoveChild</a:t>
-            </a:r>
-            <a:endParaRPr lang="en-US" altLang="pt-BR"/>
-          </a:p>
-        </p:txBody>
-      </p:sp>
-      <p:sp>
-        <p:nvSpPr>
-          <p:cNvPr id="8" name="Espaço Reservado para Conteúdo 7"/>
-          <p:cNvSpPr/>
+              <a:t>Resultado</a:t>
+            </a:r>
+            <a:endParaRPr lang="pt-BR" altLang="en-US"/>
+          </a:p>
+        </p:txBody>
+      </p:sp>
+      <p:sp>
+        <p:nvSpPr>
+          <p:cNvPr id="3" name="Espaço Reservado para Conteúdo 2"/>
+          <p:cNvSpPr>
+            <a:spLocks noGrp="1"/>
+          </p:cNvSpPr>
           <p:nvPr>
             <p:ph idx="1"/>
           </p:nvPr>
@@ -5982,130 +5943,80 @@
         <p:txBody>
           <a:bodyPr/>
           <a:p>
-            <a:r>
-              <a:rPr lang="pt-BR" altLang="en-US" sz="2400"/>
-              <a:t>Sintaxe:</a:t>
-            </a:r>
-            <a:endParaRPr lang="pt-BR" altLang="en-US" sz="2400"/>
-          </a:p>
-          <a:p>
-            <a:pPr marL="0" indent="0">
-              <a:buNone/>
-            </a:pPr>
-            <a:r>
-              <a:rPr lang="en-US" altLang="pt-BR" sz="2400"/>
-              <a:t>parentElement.removeChild(childElement);</a:t>
-            </a:r>
-            <a:endParaRPr lang="en-US" altLang="pt-BR" sz="2400"/>
-          </a:p>
-          <a:p>
-            <a:pPr marL="0" indent="0">
-              <a:buNone/>
-            </a:pPr>
-            <a:endParaRPr lang="en-US" altLang="pt-BR" sz="2400"/>
-          </a:p>
-          <a:p>
-            <a:pPr marL="0" indent="0">
-              <a:buNone/>
-            </a:pPr>
-            <a:r>
-              <a:rPr lang="en-US" altLang="pt-BR" sz="2400"/>
-              <a:t>parentElement: O elemento pai que cont</a:t>
-            </a:r>
-            <a:r>
-              <a:rPr lang="en-US" altLang="en-US" sz="2400"/>
-              <a:t>é</a:t>
-            </a:r>
-            <a:r>
-              <a:rPr lang="en-US" altLang="pt-BR" sz="2400"/>
-              <a:t>m o elemento a ser removido.</a:t>
-            </a:r>
-            <a:endParaRPr lang="en-US" altLang="pt-BR" sz="2400"/>
-          </a:p>
-          <a:p>
-            <a:pPr marL="0" indent="0">
-              <a:buNone/>
-            </a:pPr>
-            <a:r>
-              <a:rPr lang="en-US" altLang="pt-BR" sz="2400"/>
-              <a:t>childElement: O elemento filho que ser</a:t>
-            </a:r>
-            <a:r>
-              <a:rPr lang="en-US" altLang="en-US" sz="2400"/>
-              <a:t>á</a:t>
-            </a:r>
-            <a:r>
-              <a:rPr lang="en-US" altLang="pt-BR" sz="2400"/>
-              <a:t> removido.</a:t>
-            </a:r>
-            <a:endParaRPr lang="en-US" altLang="pt-BR" sz="2400"/>
-          </a:p>
-          <a:p>
-            <a:pPr marL="0" indent="0">
-              <a:buNone/>
-            </a:pPr>
-            <a:endParaRPr lang="en-US" altLang="pt-BR" sz="2400"/>
-          </a:p>
-          <a:p>
-            <a:pPr marL="0" indent="0">
-              <a:buNone/>
-            </a:pPr>
-            <a:r>
-              <a:rPr lang="pt-BR" altLang="en-US" sz="2400"/>
-              <a:t>Exemplo:</a:t>
-            </a:r>
-            <a:br>
-              <a:rPr lang="pt-BR" altLang="en-US" sz="2400"/>
-            </a:br>
-            <a:r>
-              <a:rPr lang="en-US" altLang="pt-BR" sz="2400"/>
-              <a:t>const container = document.getElementById("container");</a:t>
-            </a:r>
-            <a:endParaRPr lang="en-US" altLang="pt-BR" sz="2400"/>
-          </a:p>
-          <a:p>
-            <a:pPr marL="0" indent="0">
-              <a:buNone/>
-            </a:pPr>
-            <a:r>
-              <a:rPr lang="en-US" altLang="pt-BR" sz="2400"/>
-              <a:t>const paragrafo = document.getElementById("paragrafo");</a:t>
-            </a:r>
-            <a:endParaRPr lang="en-US" altLang="pt-BR" sz="2400"/>
-          </a:p>
-          <a:p>
-            <a:pPr marL="0" indent="0">
-              <a:buNone/>
-            </a:pPr>
-            <a:r>
-              <a:rPr lang="en-US" altLang="pt-BR" sz="2400"/>
-              <a:t>// Remove o par</a:t>
-            </a:r>
-            <a:r>
-              <a:rPr lang="en-US" altLang="en-US" sz="2400"/>
-              <a:t>á</a:t>
-            </a:r>
-            <a:r>
-              <a:rPr lang="en-US" altLang="pt-BR" sz="2400"/>
-              <a:t>grafo do elemento pai</a:t>
-            </a:r>
-            <a:endParaRPr lang="en-US" altLang="pt-BR" sz="2400"/>
-          </a:p>
-          <a:p>
-            <a:pPr marL="0" indent="0">
-              <a:buNone/>
-            </a:pPr>
-            <a:r>
-              <a:rPr lang="en-US" altLang="pt-BR" sz="2400"/>
-              <a:t>container.removeChild(paragrafo);</a:t>
-            </a:r>
-            <a:endParaRPr lang="en-US" altLang="pt-BR" sz="2400"/>
-          </a:p>
-          <a:p>
-            <a:pPr marL="0" indent="0">
-              <a:buNone/>
-            </a:pPr>
-            <a:endParaRPr lang="en-US" altLang="pt-BR" sz="2400"/>
+            <a:pPr marL="0" indent="0">
+              <a:buNone/>
+            </a:pPr>
+            <a:r>
+              <a:rPr lang="en-US" altLang="pt-BR"/>
+              <a:t>&lt;ul&gt;</a:t>
+            </a:r>
+            <a:endParaRPr lang="en-US" altLang="pt-BR"/>
+          </a:p>
+          <a:p>
+            <a:pPr marL="0" indent="0">
+              <a:buNone/>
+            </a:pPr>
+            <a:r>
+              <a:rPr lang="en-US" altLang="pt-BR"/>
+              <a:t>  &lt;li&gt;Item 1&lt;/li&gt;</a:t>
+            </a:r>
+            <a:endParaRPr lang="en-US" altLang="pt-BR"/>
+          </a:p>
+          <a:p>
+            <a:pPr marL="0" indent="0">
+              <a:buNone/>
+            </a:pPr>
+            <a:r>
+              <a:rPr lang="en-US" altLang="pt-BR"/>
+              <a:t>  &lt;li&gt;Item 2&lt;/li&gt;</a:t>
+            </a:r>
+            <a:endParaRPr lang="en-US" altLang="pt-BR"/>
+          </a:p>
+          <a:p>
+            <a:pPr marL="0" indent="0">
+              <a:buNone/>
+            </a:pPr>
+            <a:r>
+              <a:rPr lang="en-US" altLang="pt-BR"/>
+              <a:t>  &lt;li&gt;Item 3&lt;/li&gt;</a:t>
+            </a:r>
+            <a:endParaRPr lang="en-US" altLang="pt-BR"/>
+          </a:p>
+          <a:p>
+            <a:pPr marL="0" indent="0">
+              <a:buNone/>
+            </a:pPr>
+            <a:r>
+              <a:rPr lang="en-US" altLang="pt-BR"/>
+              <a:t>  &lt;li&gt;Item 4&lt;/li&gt;</a:t>
+            </a:r>
+            <a:endParaRPr lang="en-US" altLang="pt-BR"/>
+          </a:p>
+          <a:p>
+            <a:pPr marL="0" indent="0">
+              <a:buNone/>
+            </a:pPr>
+            <a:r>
+              <a:rPr lang="en-US" altLang="pt-BR"/>
+              <a:t>  &lt;li&gt;Item 5&lt;/li&gt;</a:t>
+            </a:r>
+            <a:endParaRPr lang="en-US" altLang="pt-BR"/>
+          </a:p>
+          <a:p>
+            <a:pPr marL="0" indent="0">
+              <a:buNone/>
+            </a:pPr>
+            <a:r>
+              <a:rPr lang="en-US" altLang="pt-BR"/>
+              <a:t>&lt;/ul&gt;</a:t>
+            </a:r>
+            <a:endParaRPr lang="en-US" altLang="pt-BR"/>
+          </a:p>
+          <a:p>
+            <a:pPr marL="0" indent="0">
+              <a:buNone/>
+            </a:pPr>
+            <a:endParaRPr lang="en-US" altLang="pt-BR"/>
           </a:p>
         </p:txBody>
       </p:sp>
@@ -6161,191 +6072,134 @@
             <p:ph idx="1"/>
           </p:nvPr>
         </p:nvSpPr>
-        <p:spPr>
-          <a:xfrm>
-            <a:off x="457200" y="952500"/>
-            <a:ext cx="8229600" cy="4953000"/>
-          </a:xfrm>
-        </p:spPr>
-        <p:txBody>
-          <a:bodyPr/>
-          <a:p>
-            <a:r>
-              <a:rPr lang="pt-BR" altLang="en-US" sz="2000"/>
+        <p:spPr/>
+        <p:txBody>
+          <a:bodyPr/>
+          <a:p>
+            <a:r>
+              <a:rPr lang="pt-BR" altLang="en-US" sz="2400"/>
               <a:t>Sintaxe:</a:t>
             </a:r>
-            <a:endParaRPr lang="pt-BR" altLang="en-US" sz="2000"/>
-          </a:p>
-          <a:p>
-            <a:pPr marL="0" indent="0">
-              <a:buNone/>
-            </a:pPr>
-            <a:r>
-              <a:rPr lang="en-US" altLang="pt-BR" sz="2000"/>
-              <a:t>parentElement.replaceChild(newChild, oldChild);</a:t>
-            </a:r>
-            <a:endParaRPr lang="en-US" altLang="pt-BR" sz="2000"/>
-          </a:p>
-          <a:p>
-            <a:pPr marL="0" indent="0">
-              <a:buNone/>
-            </a:pPr>
-            <a:endParaRPr lang="en-US" altLang="pt-BR" sz="2000"/>
-          </a:p>
-          <a:p>
-            <a:r>
-              <a:rPr lang="en-US" altLang="pt-BR" sz="2000"/>
+            <a:endParaRPr lang="pt-BR" altLang="en-US" sz="2400"/>
+          </a:p>
+          <a:p>
+            <a:pPr marL="0" indent="0">
+              <a:buNone/>
+            </a:pPr>
+            <a:r>
+              <a:rPr lang="en-US" altLang="pt-BR" sz="2400"/>
+              <a:t>parentElement.removeChild(childElement);</a:t>
+            </a:r>
+            <a:endParaRPr lang="en-US" altLang="pt-BR" sz="2400"/>
+          </a:p>
+          <a:p>
+            <a:pPr marL="0" indent="0">
+              <a:buNone/>
+            </a:pPr>
+            <a:endParaRPr lang="en-US" altLang="pt-BR" sz="2400"/>
+          </a:p>
+          <a:p>
+            <a:pPr marL="0" indent="0">
+              <a:buNone/>
+            </a:pPr>
+            <a:r>
+              <a:rPr lang="en-US" altLang="pt-BR" sz="2400"/>
               <a:t>parentElement: O elemento pai que cont</a:t>
             </a:r>
             <a:r>
-              <a:rPr lang="en-US" altLang="en-US" sz="2000"/>
+              <a:rPr lang="en-US" altLang="en-US" sz="2400"/>
               <a:t>é</a:t>
             </a:r>
             <a:r>
-              <a:rPr lang="en-US" altLang="pt-BR" sz="2000"/>
-              <a:t>m o elemento a ser substitu</a:t>
-            </a:r>
-            <a:r>
-              <a:rPr lang="en-US" altLang="en-US" sz="2000"/>
-              <a:t>í</a:t>
-            </a:r>
-            <a:r>
-              <a:rPr lang="en-US" altLang="pt-BR" sz="2000"/>
-              <a:t>do.</a:t>
-            </a:r>
-            <a:endParaRPr lang="en-US" altLang="pt-BR" sz="2000"/>
-          </a:p>
-          <a:p>
-            <a:r>
-              <a:rPr lang="en-US" altLang="pt-BR" sz="2000"/>
-              <a:t>newChild: O novo elemento que substituir</a:t>
-            </a:r>
-            <a:r>
-              <a:rPr lang="en-US" altLang="en-US" sz="2000"/>
+              <a:rPr lang="en-US" altLang="pt-BR" sz="2400"/>
+              <a:t>m o elemento a ser removido.</a:t>
+            </a:r>
+            <a:endParaRPr lang="en-US" altLang="pt-BR" sz="2400"/>
+          </a:p>
+          <a:p>
+            <a:pPr marL="0" indent="0">
+              <a:buNone/>
+            </a:pPr>
+            <a:r>
+              <a:rPr lang="en-US" altLang="pt-BR" sz="2400"/>
+              <a:t>childElement: O elemento filho que ser</a:t>
+            </a:r>
+            <a:r>
+              <a:rPr lang="en-US" altLang="en-US" sz="2400"/>
               <a:t>á</a:t>
             </a:r>
             <a:r>
-              <a:rPr lang="en-US" altLang="pt-BR" sz="2000"/>
-              <a:t> o elemento antigo.</a:t>
-            </a:r>
-            <a:endParaRPr lang="en-US" altLang="pt-BR" sz="2000"/>
-          </a:p>
-          <a:p>
-            <a:r>
-              <a:rPr lang="en-US" altLang="pt-BR" sz="2000"/>
-              <a:t>oldChild: O elemento existente que ser</a:t>
-            </a:r>
-            <a:r>
-              <a:rPr lang="en-US" altLang="en-US" sz="2000"/>
+              <a:rPr lang="en-US" altLang="pt-BR" sz="2400"/>
+              <a:t> removido.</a:t>
+            </a:r>
+            <a:endParaRPr lang="en-US" altLang="pt-BR" sz="2400"/>
+          </a:p>
+          <a:p>
+            <a:pPr marL="0" indent="0">
+              <a:buNone/>
+            </a:pPr>
+            <a:endParaRPr lang="en-US" altLang="pt-BR" sz="2400"/>
+          </a:p>
+          <a:p>
+            <a:pPr marL="0" indent="0">
+              <a:buNone/>
+            </a:pPr>
+            <a:r>
+              <a:rPr lang="pt-BR" altLang="en-US" sz="2400"/>
+              <a:t>Exemplo:</a:t>
+            </a:r>
+            <a:br>
+              <a:rPr lang="pt-BR" altLang="en-US" sz="2400"/>
+            </a:br>
+            <a:r>
+              <a:rPr lang="en-US" altLang="pt-BR" sz="2400"/>
+              <a:t>const container = document.getElementById("container");</a:t>
+            </a:r>
+            <a:endParaRPr lang="en-US" altLang="pt-BR" sz="2400"/>
+          </a:p>
+          <a:p>
+            <a:pPr marL="0" indent="0">
+              <a:buNone/>
+            </a:pPr>
+            <a:r>
+              <a:rPr lang="en-US" altLang="pt-BR" sz="2400"/>
+              <a:t>const paragrafo = document.getElementById("paragrafo");</a:t>
+            </a:r>
+            <a:endParaRPr lang="en-US" altLang="pt-BR" sz="2400"/>
+          </a:p>
+          <a:p>
+            <a:pPr marL="0" indent="0">
+              <a:buNone/>
+            </a:pPr>
+            <a:r>
+              <a:rPr lang="en-US" altLang="pt-BR" sz="2400"/>
+              <a:t>// Remove o par</a:t>
+            </a:r>
+            <a:r>
+              <a:rPr lang="en-US" altLang="en-US" sz="2400"/>
               <a:t>á</a:t>
             </a:r>
             <a:r>
-              <a:rPr lang="en-US" altLang="pt-BR" sz="2000"/>
-              <a:t> substitu</a:t>
-            </a:r>
-            <a:r>
-              <a:rPr lang="en-US" altLang="en-US" sz="2000"/>
-              <a:t>í</a:t>
-            </a:r>
-            <a:r>
-              <a:rPr lang="en-US" altLang="pt-BR" sz="2000"/>
-              <a:t>do.</a:t>
-            </a:r>
-            <a:endParaRPr lang="en-US" altLang="pt-BR" sz="2000"/>
-          </a:p>
-          <a:p>
-            <a:endParaRPr lang="en-US" altLang="pt-BR" sz="2000"/>
-          </a:p>
-          <a:p>
-            <a:pPr marL="0" indent="0">
-              <a:buNone/>
-            </a:pPr>
-            <a:r>
-              <a:rPr lang="pt-BR" altLang="en-US" sz="2000"/>
-              <a:t>Exemplo:</a:t>
-            </a:r>
-            <a:br>
-              <a:rPr lang="pt-BR" altLang="en-US" sz="2000"/>
-            </a:br>
-            <a:r>
-              <a:rPr lang="en-US" altLang="pt-BR" sz="2000"/>
-              <a:t>const container = document.getElementById("container");</a:t>
-            </a:r>
-            <a:endParaRPr lang="en-US" altLang="pt-BR" sz="2000"/>
-          </a:p>
-          <a:p>
-            <a:pPr marL="0" indent="0">
-              <a:buNone/>
-            </a:pPr>
-            <a:r>
-              <a:rPr lang="en-US" altLang="pt-BR" sz="2000"/>
-              <a:t>const antigo = document.getElementById("antigo");</a:t>
-            </a:r>
-            <a:endParaRPr lang="en-US" altLang="pt-BR" sz="2000"/>
-          </a:p>
-          <a:p>
-            <a:pPr marL="0" indent="0">
-              <a:buNone/>
-            </a:pPr>
-            <a:r>
-              <a:rPr lang="en-US" altLang="pt-BR" sz="2000"/>
-              <a:t>// Cria um novo elemento</a:t>
-            </a:r>
-            <a:endParaRPr lang="en-US" altLang="pt-BR" sz="2000"/>
-          </a:p>
-          <a:p>
-            <a:pPr marL="0" indent="0">
-              <a:buNone/>
-            </a:pPr>
-            <a:r>
-              <a:rPr lang="en-US" altLang="pt-BR" sz="2000"/>
-              <a:t>const novo = document.createElement("p");</a:t>
-            </a:r>
-            <a:endParaRPr lang="en-US" altLang="pt-BR" sz="2000"/>
-          </a:p>
-          <a:p>
-            <a:pPr marL="0" indent="0">
-              <a:buNone/>
-            </a:pPr>
-            <a:r>
-              <a:rPr lang="en-US" altLang="pt-BR" sz="2000"/>
-              <a:t>novo.textContent = "Texto novo";</a:t>
-            </a:r>
-            <a:endParaRPr lang="en-US" altLang="pt-BR" sz="2000"/>
-          </a:p>
-          <a:p>
-            <a:pPr marL="0" indent="0">
-              <a:buNone/>
-            </a:pPr>
-            <a:r>
-              <a:rPr lang="en-US" altLang="pt-BR" sz="2000"/>
-              <a:t>// Substitui o par</a:t>
-            </a:r>
-            <a:r>
-              <a:rPr lang="en-US" altLang="en-US" sz="2000"/>
-              <a:t>á</a:t>
-            </a:r>
-            <a:r>
-              <a:rPr lang="en-US" altLang="pt-BR" sz="2000"/>
-              <a:t>grafo antigo pelo novo</a:t>
-            </a:r>
-            <a:endParaRPr lang="en-US" altLang="pt-BR" sz="2000"/>
-          </a:p>
-          <a:p>
-            <a:pPr marL="0" indent="0">
-              <a:buNone/>
-            </a:pPr>
-            <a:r>
-              <a:rPr lang="en-US" altLang="pt-BR" sz="2000"/>
-              <a:t>container.replaceChild(novo, antigo);</a:t>
-            </a:r>
-            <a:endParaRPr lang="en-US" altLang="pt-BR" sz="2000"/>
-          </a:p>
-          <a:p>
-            <a:pPr marL="0" indent="0">
-              <a:buNone/>
-            </a:pPr>
-            <a:endParaRPr lang="en-US" altLang="pt-BR" sz="2000"/>
+              <a:rPr lang="en-US" altLang="pt-BR" sz="2400"/>
+              <a:t>grafo do elemento pai</a:t>
+            </a:r>
+            <a:endParaRPr lang="en-US" altLang="pt-BR" sz="2400"/>
+          </a:p>
+          <a:p>
+            <a:pPr marL="0" indent="0">
+              <a:buNone/>
+            </a:pPr>
+            <a:r>
+              <a:rPr lang="en-US" altLang="pt-BR" sz="2400"/>
+              <a:t>container.removeChild(paragrafo);</a:t>
+            </a:r>
+            <a:endParaRPr lang="en-US" altLang="pt-BR" sz="2400"/>
+          </a:p>
+          <a:p>
+            <a:pPr marL="0" indent="0">
+              <a:buNone/>
+            </a:pPr>
+            <a:endParaRPr lang="en-US" altLang="pt-BR" sz="2400"/>
           </a:p>
         </p:txBody>
       </p:sp>
@@ -6369,7 +6223,7 @@
       <p:grpSpPr/>
       <p:sp>
         <p:nvSpPr>
-          <p:cNvPr id="2" name="Title 1"/>
+          <p:cNvPr id="2" name="Título 1"/>
           <p:cNvSpPr>
             <a:spLocks noGrp="1"/>
           </p:cNvSpPr>
@@ -6380,68 +6234,212 @@
         <p:spPr/>
         <p:txBody>
           <a:bodyPr/>
-          <a:lstStyle/>
-          <a:p>
-            <a:r>
-              <a:t>O que são Eventos?</a:t>
-            </a:r>
-          </a:p>
-        </p:txBody>
-      </p:sp>
-      <p:sp>
-        <p:nvSpPr>
-          <p:cNvPr id="3" name="Content Placeholder 2"/>
-          <p:cNvSpPr>
-            <a:spLocks noGrp="1"/>
-          </p:cNvSpPr>
+          <a:p>
+            <a:r>
+              <a:rPr lang="pt-BR" altLang="en-US"/>
+              <a:t>R</a:t>
+            </a:r>
+            <a:r>
+              <a:rPr lang="en-US" altLang="pt-BR"/>
+              <a:t>emoveChild</a:t>
+            </a:r>
+            <a:endParaRPr lang="en-US" altLang="pt-BR"/>
+          </a:p>
+        </p:txBody>
+      </p:sp>
+      <p:sp>
+        <p:nvSpPr>
+          <p:cNvPr id="8" name="Espaço Reservado para Conteúdo 7"/>
+          <p:cNvSpPr/>
           <p:nvPr>
             <p:ph idx="1"/>
           </p:nvPr>
         </p:nvSpPr>
-        <p:spPr/>
-        <p:txBody>
-          <a:bodyPr/>
-          <a:lstStyle/>
-          <a:p>
-            <a:pPr marL="0" indent="0">
-              <a:buNone/>
-            </a:pPr>
-            <a:r>
-              <a:t>Eventos são ações ou ocorrências que acontecem no navegador e podem ser capturadas pelo JavaScript.</a:t>
-            </a:r>
-          </a:p>
-          <a:p>
-            <a:pPr marL="0" indent="0">
-              <a:buNone/>
-            </a:pPr>
-            <a:r>
-              <a:t>Exemplos:</a:t>
-            </a:r>
-          </a:p>
-          <a:p>
-            <a:r>
-              <a:t>Clique do mouse (`click`)</a:t>
-            </a:r>
-          </a:p>
-          <a:p>
-            <a:r>
-              <a:t>Movimento do mouse (`mousemove`)</a:t>
-            </a:r>
-          </a:p>
-          <a:p>
-            <a:r>
-              <a:t>Pressionar uma tecla (`keydown`, `keyup`)</a:t>
-            </a:r>
-          </a:p>
-          <a:p>
-            <a:r>
-              <a:t>Carregamento da página (`load`)</a:t>
-            </a:r>
-          </a:p>
-          <a:p>
-            <a:r>
-              <a:t>Submissão de formulário (`submit`)</a:t>
-            </a:r>
+        <p:spPr>
+          <a:xfrm>
+            <a:off x="457200" y="952500"/>
+            <a:ext cx="8229600" cy="4953000"/>
+          </a:xfrm>
+        </p:spPr>
+        <p:txBody>
+          <a:bodyPr/>
+          <a:p>
+            <a:r>
+              <a:rPr lang="pt-BR" altLang="en-US" sz="2000"/>
+              <a:t>Sintaxe:</a:t>
+            </a:r>
+            <a:endParaRPr lang="pt-BR" altLang="en-US" sz="2000"/>
+          </a:p>
+          <a:p>
+            <a:pPr marL="0" indent="0">
+              <a:buNone/>
+            </a:pPr>
+            <a:r>
+              <a:rPr lang="en-US" altLang="pt-BR" sz="2000"/>
+              <a:t>parentElement.replaceChild(newChild, oldChild);</a:t>
+            </a:r>
+            <a:endParaRPr lang="en-US" altLang="pt-BR" sz="2000"/>
+          </a:p>
+          <a:p>
+            <a:pPr marL="0" indent="0">
+              <a:buNone/>
+            </a:pPr>
+            <a:endParaRPr lang="en-US" altLang="pt-BR" sz="2000"/>
+          </a:p>
+          <a:p>
+            <a:r>
+              <a:rPr lang="en-US" altLang="pt-BR" sz="2000"/>
+              <a:t>parentElement: O elemento pai que cont</a:t>
+            </a:r>
+            <a:r>
+              <a:rPr lang="en-US" altLang="en-US" sz="2000"/>
+              <a:t>é</a:t>
+            </a:r>
+            <a:r>
+              <a:rPr lang="en-US" altLang="pt-BR" sz="2000"/>
+              <a:t>m o elemento a ser substitu</a:t>
+            </a:r>
+            <a:r>
+              <a:rPr lang="en-US" altLang="en-US" sz="2000"/>
+              <a:t>í</a:t>
+            </a:r>
+            <a:r>
+              <a:rPr lang="en-US" altLang="pt-BR" sz="2000"/>
+              <a:t>do.</a:t>
+            </a:r>
+            <a:endParaRPr lang="en-US" altLang="pt-BR" sz="2000"/>
+          </a:p>
+          <a:p>
+            <a:r>
+              <a:rPr lang="en-US" altLang="pt-BR" sz="2000"/>
+              <a:t>newChild: O novo elemento que substituir</a:t>
+            </a:r>
+            <a:r>
+              <a:rPr lang="en-US" altLang="en-US" sz="2000"/>
+              <a:t>á</a:t>
+            </a:r>
+            <a:r>
+              <a:rPr lang="en-US" altLang="pt-BR" sz="2000"/>
+              <a:t> o elemento antigo.</a:t>
+            </a:r>
+            <a:endParaRPr lang="en-US" altLang="pt-BR" sz="2000"/>
+          </a:p>
+          <a:p>
+            <a:r>
+              <a:rPr lang="en-US" altLang="pt-BR" sz="2000"/>
+              <a:t>oldChild: O elemento existente que ser</a:t>
+            </a:r>
+            <a:r>
+              <a:rPr lang="en-US" altLang="en-US" sz="2000"/>
+              <a:t>á</a:t>
+            </a:r>
+            <a:r>
+              <a:rPr lang="en-US" altLang="pt-BR" sz="2000"/>
+              <a:t> substitu</a:t>
+            </a:r>
+            <a:r>
+              <a:rPr lang="en-US" altLang="en-US" sz="2000"/>
+              <a:t>í</a:t>
+            </a:r>
+            <a:r>
+              <a:rPr lang="en-US" altLang="pt-BR" sz="2000"/>
+              <a:t>do.</a:t>
+            </a:r>
+            <a:endParaRPr lang="en-US" altLang="pt-BR" sz="2000"/>
+          </a:p>
+          <a:p>
+            <a:endParaRPr lang="en-US" altLang="pt-BR" sz="2000"/>
+          </a:p>
+          <a:p>
+            <a:pPr marL="0" indent="0">
+              <a:buNone/>
+            </a:pPr>
+            <a:r>
+              <a:rPr lang="pt-BR" altLang="en-US" sz="2000"/>
+              <a:t>Exemplo:</a:t>
+            </a:r>
+            <a:br>
+              <a:rPr lang="pt-BR" altLang="en-US" sz="2000"/>
+            </a:br>
+            <a:r>
+              <a:rPr lang="en-US" altLang="pt-BR" sz="2000"/>
+              <a:t>const container = document.getElementById("container");</a:t>
+            </a:r>
+            <a:endParaRPr lang="en-US" altLang="pt-BR" sz="2000"/>
+          </a:p>
+          <a:p>
+            <a:pPr marL="0" indent="0">
+              <a:buNone/>
+            </a:pPr>
+            <a:r>
+              <a:rPr lang="en-US" altLang="pt-BR" sz="2000"/>
+              <a:t>const antigo = document.getElementById("antigo");</a:t>
+            </a:r>
+            <a:endParaRPr lang="en-US" altLang="pt-BR" sz="2000"/>
+          </a:p>
+          <a:p>
+            <a:pPr marL="0" indent="0">
+              <a:buNone/>
+            </a:pPr>
+            <a:r>
+              <a:rPr lang="en-US" altLang="pt-BR" sz="2000"/>
+              <a:t>// Cria um novo elemento</a:t>
+            </a:r>
+            <a:endParaRPr lang="en-US" altLang="pt-BR" sz="2000"/>
+          </a:p>
+          <a:p>
+            <a:pPr marL="0" indent="0">
+              <a:buNone/>
+            </a:pPr>
+            <a:r>
+              <a:rPr lang="en-US" altLang="pt-BR" sz="2000"/>
+              <a:t>const novo = document.createElement("p");</a:t>
+            </a:r>
+            <a:endParaRPr lang="en-US" altLang="pt-BR" sz="2000"/>
+          </a:p>
+          <a:p>
+            <a:pPr marL="0" indent="0">
+              <a:buNone/>
+            </a:pPr>
+            <a:r>
+              <a:rPr lang="en-US" altLang="pt-BR" sz="2000"/>
+              <a:t>novo.textContent = "Texto novo";</a:t>
+            </a:r>
+            <a:endParaRPr lang="en-US" altLang="pt-BR" sz="2000"/>
+          </a:p>
+          <a:p>
+            <a:pPr marL="0" indent="0">
+              <a:buNone/>
+            </a:pPr>
+            <a:r>
+              <a:rPr lang="en-US" altLang="pt-BR" sz="2000"/>
+              <a:t>// Substitui o par</a:t>
+            </a:r>
+            <a:r>
+              <a:rPr lang="en-US" altLang="en-US" sz="2000"/>
+              <a:t>á</a:t>
+            </a:r>
+            <a:r>
+              <a:rPr lang="en-US" altLang="pt-BR" sz="2000"/>
+              <a:t>grafo antigo pelo novo</a:t>
+            </a:r>
+            <a:endParaRPr lang="en-US" altLang="pt-BR" sz="2000"/>
+          </a:p>
+          <a:p>
+            <a:pPr marL="0" indent="0">
+              <a:buNone/>
+            </a:pPr>
+            <a:r>
+              <a:rPr lang="en-US" altLang="pt-BR" sz="2000"/>
+              <a:t>container.replaceChild(novo, antigo);</a:t>
+            </a:r>
+            <a:endParaRPr lang="en-US" altLang="pt-BR" sz="2000"/>
+          </a:p>
+          <a:p>
+            <a:pPr marL="0" indent="0">
+              <a:buNone/>
+            </a:pPr>
+            <a:endParaRPr lang="en-US" altLang="pt-BR" sz="2000"/>
           </a:p>
         </p:txBody>
       </p:sp>
@@ -6479,7 +6477,7 @@
           <a:lstStyle/>
           <a:p>
             <a:r>
-              <a:t>Como Lidar com Eventos</a:t>
+              <a:t>O que são Eventos?</a:t>
             </a:r>
           </a:p>
         </p:txBody>
@@ -6499,62 +6497,45 @@
           <a:bodyPr/>
           <a:lstStyle/>
           <a:p>
-            <a:r>
-              <a:t>Você pode adicionar eventos aos elementos de duas formas:</a:t>
-            </a:r>
-          </a:p>
-          <a:p/>
-          <a:p>
-            <a:r>
-              <a:t>Usando atributos HTML:</a:t>
-            </a:r>
-          </a:p>
-          <a:p>
-            <a:pPr marL="0" indent="0">
-              <a:buNone/>
-            </a:pPr>
-            <a:r>
-              <a:rPr sz="2400"/>
-              <a:t>`&lt;button onclick='minhaFuncao()'&gt;Clique aqui&lt;/button&gt;</a:t>
-            </a:r>
-            <a:r>
-              <a:t>`</a:t>
-            </a:r>
-          </a:p>
-          <a:p>
-            <a:r>
-              <a:t>Usando JavaScript:</a:t>
-            </a:r>
-          </a:p>
-          <a:p>
-            <a:pPr marL="0" indent="0">
-              <a:buNone/>
-            </a:pPr>
-            <a:r>
-              <a:rPr sz="2400"/>
-              <a:t>element.addEventListener('click', () =&gt; {</a:t>
-            </a:r>
-            <a:endParaRPr sz="2400"/>
-          </a:p>
-          <a:p>
-            <a:pPr marL="0" indent="0">
-              <a:buNone/>
-            </a:pPr>
-            <a:r>
-              <a:rPr sz="2400"/>
-              <a:t>    console.log('Clicado!');</a:t>
-            </a:r>
-            <a:endParaRPr sz="2400"/>
-          </a:p>
-          <a:p>
-            <a:pPr marL="0" indent="0">
-              <a:buNone/>
-            </a:pPr>
-            <a:r>
-              <a:rPr sz="2400"/>
-              <a:t>});</a:t>
-            </a:r>
-            <a:endParaRPr sz="2400"/>
+            <a:pPr marL="0" indent="0">
+              <a:buNone/>
+            </a:pPr>
+            <a:r>
+              <a:t>Eventos são ações ou ocorrências que acontecem no navegador e podem ser capturadas pelo JavaScript.</a:t>
+            </a:r>
+          </a:p>
+          <a:p>
+            <a:pPr marL="0" indent="0">
+              <a:buNone/>
+            </a:pPr>
+            <a:r>
+              <a:t>Exemplos:</a:t>
+            </a:r>
+          </a:p>
+          <a:p>
+            <a:r>
+              <a:t>Clique do mouse (`click`)</a:t>
+            </a:r>
+          </a:p>
+          <a:p>
+            <a:r>
+              <a:t>Movimento do mouse (`mousemove`)</a:t>
+            </a:r>
+          </a:p>
+          <a:p>
+            <a:r>
+              <a:t>Pressionar uma tecla (`keydown`, `keyup`)</a:t>
+            </a:r>
+          </a:p>
+          <a:p>
+            <a:r>
+              <a:t>Carregamento da página (`load`)</a:t>
+            </a:r>
+          </a:p>
+          <a:p>
+            <a:r>
+              <a:t>Submissão de formulário (`submit`)</a:t>
+            </a:r>
           </a:p>
         </p:txBody>
       </p:sp>
@@ -6592,7 +6573,7 @@
           <a:lstStyle/>
           <a:p>
             <a:r>
-              <a:t>Delegação de Eventos</a:t>
+              <a:t>Como Lidar com Eventos</a:t>
             </a:r>
           </a:p>
         </p:txBody>
@@ -6612,73 +6593,62 @@
           <a:bodyPr/>
           <a:lstStyle/>
           <a:p>
-            <a:pPr marL="0" indent="457200">
-              <a:buNone/>
-            </a:pPr>
-            <a:r>
-              <a:rPr lang="en-US" altLang="pt-BR"/>
-              <a:t>Delega</a:t>
-            </a:r>
-            <a:r>
-              <a:rPr lang="" altLang="en-US"/>
-              <a:t>ç</a:t>
-            </a:r>
-            <a:r>
-              <a:rPr lang="en-US" altLang="en-US"/>
-              <a:t>ã</a:t>
-            </a:r>
-            <a:r>
-              <a:rPr lang="en-US" altLang="pt-BR"/>
-              <a:t>o de Eventos </a:t>
-            </a:r>
-            <a:r>
-              <a:rPr lang="en-US" altLang="en-US"/>
-              <a:t>é</a:t>
-            </a:r>
-            <a:r>
-              <a:rPr lang="en-US" altLang="pt-BR"/>
-              <a:t> uma t</a:t>
-            </a:r>
-            <a:r>
-              <a:rPr lang="en-US" altLang="en-US"/>
-              <a:t>é</a:t>
-            </a:r>
-            <a:r>
-              <a:rPr lang="en-US" altLang="pt-BR"/>
-              <a:t>cnica em JavaScript que permite que voc</a:t>
-            </a:r>
-            <a:r>
-              <a:rPr lang="en-US" altLang="en-US"/>
-              <a:t>ê</a:t>
-            </a:r>
-            <a:r>
-              <a:rPr lang="en-US" altLang="pt-BR"/>
-              <a:t> gerencie eventos de v</a:t>
-            </a:r>
-            <a:r>
-              <a:rPr lang="en-US" altLang="en-US"/>
-              <a:t>á</a:t>
-            </a:r>
-            <a:r>
-              <a:rPr lang="en-US" altLang="pt-BR"/>
-              <a:t>rios elementos filhos atrav</a:t>
-            </a:r>
-            <a:r>
-              <a:rPr lang="en-US" altLang="en-US"/>
-              <a:t>é</a:t>
-            </a:r>
-            <a:r>
-              <a:rPr lang="en-US" altLang="pt-BR"/>
-              <a:t>s de um </a:t>
-            </a:r>
-            <a:r>
-              <a:rPr lang="en-US" altLang="en-US"/>
-              <a:t>ú</a:t>
-            </a:r>
-            <a:r>
-              <a:rPr lang="en-US" altLang="pt-BR"/>
-              <a:t>nico manipulador de eventos no elemento pai.</a:t>
-            </a:r>
+            <a:r>
+              <a:t>Você pode adicionar eventos aos elementos de duas formas:</a:t>
+            </a:r>
+          </a:p>
+          <a:p/>
+          <a:p>
+            <a:r>
+              <a:t>Usando atributos HTML:</a:t>
+            </a:r>
+          </a:p>
+          <a:p>
+            <a:pPr marL="0" indent="0">
+              <a:buNone/>
+            </a:pPr>
+            <a:r>
+              <a:rPr sz="2400"/>
+              <a:t>`&lt;button onclick='minhaFuncao()'&gt;Clique aqui&lt;/button&gt;</a:t>
+            </a:r>
+            <a:r>
+              <a:t>`</a:t>
+            </a:r>
+          </a:p>
+          <a:p>
+            <a:r>
+              <a:t>Usando JavaScript:</a:t>
+            </a:r>
+          </a:p>
+          <a:p>
+            <a:pPr marL="0" indent="0">
+              <a:buNone/>
+            </a:pPr>
+            <a:r>
+              <a:rPr sz="2400"/>
+              <a:t>element.addEventListener('click', () =&gt; {</a:t>
+            </a:r>
+            <a:endParaRPr sz="2400"/>
+          </a:p>
+          <a:p>
+            <a:pPr marL="0" indent="0">
+              <a:buNone/>
+            </a:pPr>
+            <a:r>
+              <a:rPr sz="2400"/>
+              <a:t>    console.log('Clicado!');</a:t>
+            </a:r>
+            <a:endParaRPr sz="2400"/>
+          </a:p>
+          <a:p>
+            <a:pPr marL="0" indent="0">
+              <a:buNone/>
+            </a:pPr>
+            <a:r>
+              <a:rPr sz="2400"/>
+              <a:t>});</a:t>
+            </a:r>
+            <a:endParaRPr sz="2400"/>
           </a:p>
         </p:txBody>
       </p:sp>
@@ -6751,6 +6721,131 @@
 </file>
 
 <file path=ppt/slides/slide20.xml><?xml version="1.0" encoding="utf-8"?>
+<p:sld xmlns:a="http://schemas.openxmlformats.org/drawingml/2006/main" xmlns:r="http://schemas.openxmlformats.org/officeDocument/2006/relationships" xmlns:p="http://schemas.openxmlformats.org/presentationml/2006/main">
+  <p:cSld>
+    <p:spTree>
+      <p:nvGrpSpPr>
+        <p:cNvPr id="1" name=""/>
+        <p:cNvGrpSpPr/>
+        <p:nvPr/>
+      </p:nvGrpSpPr>
+      <p:grpSpPr/>
+      <p:sp>
+        <p:nvSpPr>
+          <p:cNvPr id="2" name="Title 1"/>
+          <p:cNvSpPr>
+            <a:spLocks noGrp="1"/>
+          </p:cNvSpPr>
+          <p:nvPr>
+            <p:ph type="title"/>
+          </p:nvPr>
+        </p:nvSpPr>
+        <p:spPr/>
+        <p:txBody>
+          <a:bodyPr/>
+          <a:lstStyle/>
+          <a:p>
+            <a:r>
+              <a:t>Delegação de Eventos</a:t>
+            </a:r>
+          </a:p>
+        </p:txBody>
+      </p:sp>
+      <p:sp>
+        <p:nvSpPr>
+          <p:cNvPr id="3" name="Content Placeholder 2"/>
+          <p:cNvSpPr>
+            <a:spLocks noGrp="1"/>
+          </p:cNvSpPr>
+          <p:nvPr>
+            <p:ph idx="1"/>
+          </p:nvPr>
+        </p:nvSpPr>
+        <p:spPr/>
+        <p:txBody>
+          <a:bodyPr/>
+          <a:lstStyle/>
+          <a:p>
+            <a:pPr marL="0" indent="457200">
+              <a:buNone/>
+            </a:pPr>
+            <a:r>
+              <a:rPr lang="en-US" altLang="pt-BR"/>
+              <a:t>Delega</a:t>
+            </a:r>
+            <a:r>
+              <a:rPr lang="en-US" altLang="en-US"/>
+              <a:t>ç</a:t>
+            </a:r>
+            <a:r>
+              <a:rPr lang="en-US" altLang="en-US"/>
+              <a:t>ã</a:t>
+            </a:r>
+            <a:r>
+              <a:rPr lang="en-US" altLang="pt-BR"/>
+              <a:t>o de Eventos </a:t>
+            </a:r>
+            <a:r>
+              <a:rPr lang="en-US" altLang="en-US"/>
+              <a:t>é</a:t>
+            </a:r>
+            <a:r>
+              <a:rPr lang="en-US" altLang="pt-BR"/>
+              <a:t> uma t</a:t>
+            </a:r>
+            <a:r>
+              <a:rPr lang="en-US" altLang="en-US"/>
+              <a:t>é</a:t>
+            </a:r>
+            <a:r>
+              <a:rPr lang="en-US" altLang="pt-BR"/>
+              <a:t>cnica em JavaScript que permite que voc</a:t>
+            </a:r>
+            <a:r>
+              <a:rPr lang="en-US" altLang="en-US"/>
+              <a:t>ê</a:t>
+            </a:r>
+            <a:r>
+              <a:rPr lang="en-US" altLang="pt-BR"/>
+              <a:t> gerencie eventos de v</a:t>
+            </a:r>
+            <a:r>
+              <a:rPr lang="en-US" altLang="en-US"/>
+              <a:t>á</a:t>
+            </a:r>
+            <a:r>
+              <a:rPr lang="en-US" altLang="pt-BR"/>
+              <a:t>rios elementos filhos atrav</a:t>
+            </a:r>
+            <a:r>
+              <a:rPr lang="en-US" altLang="en-US"/>
+              <a:t>é</a:t>
+            </a:r>
+            <a:r>
+              <a:rPr lang="en-US" altLang="pt-BR"/>
+              <a:t>s de um </a:t>
+            </a:r>
+            <a:r>
+              <a:rPr lang="en-US" altLang="en-US"/>
+              <a:t>ú</a:t>
+            </a:r>
+            <a:r>
+              <a:rPr lang="en-US" altLang="pt-BR"/>
+              <a:t>nico manipulador de eventos no elemento pai.</a:t>
+            </a:r>
+            <a:endParaRPr lang="en-US" altLang="pt-BR"/>
+          </a:p>
+        </p:txBody>
+      </p:sp>
+    </p:spTree>
+  </p:cSld>
+  <p:clrMapOvr>
+    <a:masterClrMapping/>
+  </p:clrMapOvr>
+</p:sld>
+</file>
+
+<file path=ppt/slides/slide21.xml><?xml version="1.0" encoding="utf-8"?>
 <p:sld xmlns:a="http://schemas.openxmlformats.org/drawingml/2006/main" xmlns:r="http://schemas.openxmlformats.org/officeDocument/2006/relationships" xmlns:p="http://schemas.openxmlformats.org/presentationml/2006/main">
   <p:cSld>
     <p:spTree>
@@ -6943,89 +7038,6 @@
 </p:sld>
 </file>
 
-<file path=ppt/slides/slide21.xml><?xml version="1.0" encoding="utf-8"?>
-<p:sld xmlns:a="http://schemas.openxmlformats.org/drawingml/2006/main" xmlns:r="http://schemas.openxmlformats.org/officeDocument/2006/relationships" xmlns:p="http://schemas.openxmlformats.org/presentationml/2006/main">
-  <p:cSld>
-    <p:spTree>
-      <p:nvGrpSpPr>
-        <p:cNvPr id="1" name=""/>
-        <p:cNvGrpSpPr/>
-        <p:nvPr/>
-      </p:nvGrpSpPr>
-      <p:grpSpPr/>
-      <p:sp>
-        <p:nvSpPr>
-          <p:cNvPr id="2" name="Título 1"/>
-          <p:cNvSpPr>
-            <a:spLocks noGrp="1"/>
-          </p:cNvSpPr>
-          <p:nvPr>
-            <p:ph type="title"/>
-          </p:nvPr>
-        </p:nvSpPr>
-        <p:spPr>
-          <a:xfrm>
-            <a:off x="457200" y="441960"/>
-            <a:ext cx="8229600" cy="582613"/>
-          </a:xfrm>
-        </p:spPr>
-        <p:txBody>
-          <a:bodyPr/>
-          <a:p>
-            <a:r>
-              <a:rPr lang="en-US" altLang="pt-BR">
-                <a:sym typeface="+mn-ea"/>
-              </a:rPr>
-              <a:t>Por que a delega</a:t>
-            </a:r>
-            <a:r>
-              <a:rPr lang="en-US" altLang="en-US">
-                <a:sym typeface="+mn-ea"/>
-              </a:rPr>
-              <a:t>çã</a:t>
-            </a:r>
-            <a:r>
-              <a:rPr lang="en-US" altLang="pt-BR">
-                <a:sym typeface="+mn-ea"/>
-              </a:rPr>
-              <a:t>o de eventos </a:t>
-            </a:r>
-            <a:r>
-              <a:rPr lang="en-US" altLang="en-US">
-                <a:sym typeface="+mn-ea"/>
-              </a:rPr>
-              <a:t>é</a:t>
-            </a:r>
-            <a:r>
-              <a:rPr lang="en-US" altLang="pt-BR">
-                <a:sym typeface="+mn-ea"/>
-              </a:rPr>
-              <a:t> </a:t>
-            </a:r>
-            <a:r>
-              <a:rPr lang="en-US" altLang="en-US">
-                <a:sym typeface="+mn-ea"/>
-              </a:rPr>
-              <a:t>ú</a:t>
-            </a:r>
-            <a:r>
-              <a:rPr lang="en-US" altLang="pt-BR">
-                <a:sym typeface="+mn-ea"/>
-              </a:rPr>
-              <a:t>til para elementos criados dinamicamente?</a:t>
-            </a:r>
-            <a:endParaRPr lang="pt-BR" altLang="en-US"/>
-          </a:p>
-        </p:txBody>
-      </p:sp>
-    </p:spTree>
-  </p:cSld>
-  <p:clrMapOvr>
-    <a:masterClrMapping/>
-  </p:clrMapOvr>
-</p:sld>
-</file>
-
 <file path=ppt/slides/slide22.xml><?xml version="1.0" encoding="utf-8"?>
 <p:sld xmlns:a="http://schemas.openxmlformats.org/drawingml/2006/main" xmlns:r="http://schemas.openxmlformats.org/officeDocument/2006/relationships" xmlns:p="http://schemas.openxmlformats.org/presentationml/2006/main">
   <p:cSld>
@@ -7098,81 +7110,6 @@
               <a:t>til para elementos criados dinamicamente?</a:t>
             </a:r>
             <a:endParaRPr lang="pt-BR" altLang="en-US"/>
-          </a:p>
-        </p:txBody>
-      </p:sp>
-      <p:sp>
-        <p:nvSpPr>
-          <p:cNvPr id="6" name="Caixa de Texto 5"/>
-          <p:cNvSpPr txBox="1"/>
-          <p:nvPr/>
-        </p:nvSpPr>
-        <p:spPr>
-          <a:xfrm>
-            <a:off x="726440" y="1843405"/>
-            <a:ext cx="7689850" cy="2245360"/>
-          </a:xfrm>
-          <a:prstGeom prst="rect">
-            <a:avLst/>
-          </a:prstGeom>
-          <a:noFill/>
-        </p:spPr>
-        <p:txBody>
-          <a:bodyPr wrap="square" rtlCol="0">
-            <a:spAutoFit/>
-          </a:bodyPr>
-          <a:p>
-            <a:pPr marL="457200" indent="-457200">
-              <a:buFont typeface="Arial" panose="020B0604020202020204" pitchFamily="34" charset="0"/>
-              <a:buChar char="•"/>
-            </a:pPr>
-            <a:r>
-              <a:rPr lang="en-US" altLang="pt-BR" sz="2800">
-                <a:sym typeface="+mn-ea"/>
-              </a:rPr>
-              <a:t>Elementos futuros s</a:t>
-            </a:r>
-            <a:r>
-              <a:rPr lang="en-US" altLang="en-US" sz="2800">
-                <a:sym typeface="+mn-ea"/>
-              </a:rPr>
-              <a:t>ã</a:t>
-            </a:r>
-            <a:r>
-              <a:rPr lang="en-US" altLang="pt-BR" sz="2800">
-                <a:sym typeface="+mn-ea"/>
-              </a:rPr>
-              <a:t>o capturados</a:t>
-            </a:r>
-            <a:endParaRPr lang="en-US" altLang="pt-BR" sz="2800"/>
-          </a:p>
-          <a:p>
-            <a:pPr marL="457200" indent="-457200">
-              <a:buFont typeface="Arial" panose="020B0604020202020204" pitchFamily="34" charset="0"/>
-              <a:buChar char="•"/>
-            </a:pPr>
-            <a:endParaRPr lang="en-US" altLang="pt-BR" sz="2800"/>
-          </a:p>
-          <a:p>
-            <a:pPr marL="457200" indent="-457200">
-              <a:buFont typeface="Arial" panose="020B0604020202020204" pitchFamily="34" charset="0"/>
-              <a:buChar char="•"/>
-            </a:pPr>
-            <a:endParaRPr lang="en-US" altLang="pt-BR" sz="2800"/>
-          </a:p>
-          <a:p>
-            <a:pPr marL="457200" indent="-457200">
-              <a:buFont typeface="Arial" panose="020B0604020202020204" pitchFamily="34" charset="0"/>
-              <a:buChar char="•"/>
-            </a:pPr>
-            <a:endParaRPr lang="en-US" altLang="pt-BR" sz="2800"/>
-          </a:p>
-          <a:p>
-            <a:pPr marL="457200" indent="-457200">
-              <a:buFont typeface="Arial" panose="020B0604020202020204" pitchFamily="34" charset="0"/>
-              <a:buChar char="•"/>
-            </a:pPr>
-            <a:endParaRPr lang="en-US" altLang="pt-BR" sz="2800"/>
           </a:p>
         </p:txBody>
       </p:sp>
@@ -7206,7 +7143,7 @@
         </p:nvSpPr>
         <p:spPr>
           <a:xfrm>
-            <a:off x="457200" y="418465"/>
+            <a:off x="457200" y="441960"/>
             <a:ext cx="8229600" cy="582613"/>
           </a:xfrm>
         </p:spPr>
@@ -7261,103 +7198,75 @@
       </p:sp>
       <p:sp>
         <p:nvSpPr>
-          <p:cNvPr id="3" name="Espaço Reservado para Conteúdo 2"/>
-          <p:cNvSpPr>
-            <a:spLocks noGrp="1"/>
-          </p:cNvSpPr>
-          <p:nvPr>
-            <p:ph idx="1"/>
-          </p:nvPr>
-        </p:nvSpPr>
-        <p:spPr/>
-        <p:txBody>
-          <a:bodyPr/>
-          <a:p>
+          <p:cNvPr id="6" name="Caixa de Texto 5"/>
+          <p:cNvSpPr txBox="1"/>
+          <p:nvPr/>
+        </p:nvSpPr>
+        <p:spPr>
+          <a:xfrm>
+            <a:off x="726440" y="1843405"/>
+            <a:ext cx="7689850" cy="2245360"/>
+          </a:xfrm>
+          <a:prstGeom prst="rect">
+            <a:avLst/>
+          </a:prstGeom>
+          <a:noFill/>
+        </p:spPr>
+        <p:txBody>
+          <a:bodyPr wrap="square" rtlCol="0">
+            <a:spAutoFit/>
+          </a:bodyPr>
+          <a:p>
+            <a:pPr marL="457200" indent="-457200">
+              <a:buFont typeface="Arial" panose="020B0604020202020204" pitchFamily="34" charset="0"/>
+              <a:buChar char="•"/>
+            </a:pPr>
+            <a:r>
+              <a:rPr lang="en-US" altLang="pt-BR" sz="2800">
+                <a:sym typeface="+mn-ea"/>
+              </a:rPr>
+              <a:t>Elementos futuros s</a:t>
+            </a:r>
+            <a:r>
+              <a:rPr lang="en-US" altLang="en-US" sz="2800">
+                <a:sym typeface="+mn-ea"/>
+              </a:rPr>
+              <a:t>ã</a:t>
+            </a:r>
+            <a:r>
+              <a:rPr lang="en-US" altLang="pt-BR" sz="2800">
+                <a:sym typeface="+mn-ea"/>
+              </a:rPr>
+              <a:t>o capturados</a:t>
+            </a:r>
             <a:endParaRPr lang="en-US" altLang="pt-BR" sz="2800"/>
           </a:p>
           <a:p>
-            <a:r>
-              <a:rPr lang="en-US" altLang="pt-BR" sz="2800"/>
-              <a:t>Elementos futuros s</a:t>
-            </a:r>
-            <a:r>
-              <a:rPr lang="en-US" altLang="en-US" sz="2800"/>
-              <a:t>ã</a:t>
-            </a:r>
-            <a:r>
-              <a:rPr lang="en-US" altLang="pt-BR" sz="2800"/>
-              <a:t>o capturados:</a:t>
-            </a:r>
+            <a:pPr marL="457200" indent="-457200">
+              <a:buFont typeface="Arial" panose="020B0604020202020204" pitchFamily="34" charset="0"/>
+              <a:buChar char="•"/>
+            </a:pPr>
             <a:endParaRPr lang="en-US" altLang="pt-BR" sz="2800"/>
           </a:p>
           <a:p>
-            <a:pPr marL="0" indent="457200">
-              <a:buNone/>
-            </a:pPr>
-            <a:r>
-              <a:rPr lang="en-US" altLang="pt-BR" sz="2800"/>
-              <a:t>Quando novos elementos s</a:t>
-            </a:r>
-            <a:r>
-              <a:rPr lang="en-US" altLang="en-US" sz="2800"/>
-              <a:t>ã</a:t>
-            </a:r>
-            <a:r>
-              <a:rPr lang="en-US" altLang="pt-BR" sz="2800"/>
-              <a:t>o adicionados ao DOM (por exemplo, via appendChild ou innerHTML), eles n</a:t>
-            </a:r>
-            <a:r>
-              <a:rPr lang="en-US" altLang="en-US" sz="2800"/>
-              <a:t>ã</a:t>
-            </a:r>
-            <a:r>
-              <a:rPr lang="en-US" altLang="pt-BR" sz="2800"/>
-              <a:t>o herdam automaticamente os manipuladores de eventos.</a:t>
-            </a:r>
+            <a:pPr marL="457200" indent="-457200">
+              <a:buFont typeface="Arial" panose="020B0604020202020204" pitchFamily="34" charset="0"/>
+              <a:buChar char="•"/>
+            </a:pPr>
             <a:endParaRPr lang="en-US" altLang="pt-BR" sz="2800"/>
           </a:p>
           <a:p>
-            <a:pPr marL="0" indent="457200">
-              <a:buNone/>
-            </a:pPr>
-            <a:r>
-              <a:rPr lang="en-US" altLang="pt-BR" sz="2800"/>
-              <a:t>Com a delega</a:t>
-            </a:r>
-            <a:r>
-              <a:rPr lang="en-US" altLang="en-US" sz="2800"/>
-              <a:t>ç</a:t>
-            </a:r>
-            <a:r>
-              <a:rPr lang="en-US" altLang="en-US" sz="2800"/>
-              <a:t>ã</a:t>
-            </a:r>
-            <a:r>
-              <a:rPr lang="en-US" altLang="pt-BR" sz="2800"/>
-              <a:t>o de eventos, voc</a:t>
-            </a:r>
-            <a:r>
-              <a:rPr lang="en-US" altLang="en-US" sz="2800"/>
-              <a:t>ê</a:t>
-            </a:r>
-            <a:r>
-              <a:rPr lang="en-US" altLang="pt-BR" sz="2800"/>
-              <a:t> adiciona o manipulador em um elemento pai comum que j</a:t>
-            </a:r>
-            <a:r>
-              <a:rPr lang="en-US" altLang="en-US" sz="2800"/>
-              <a:t>á</a:t>
-            </a:r>
-            <a:r>
-              <a:rPr lang="en-US" altLang="pt-BR" sz="2800"/>
-              <a:t> existia. Esse manipulador pode "ouvir" os eventos disparados pelos novos elementos, pois o evento propaga para cima (bubbling).</a:t>
-            </a:r>
+            <a:pPr marL="457200" indent="-457200">
+              <a:buFont typeface="Arial" panose="020B0604020202020204" pitchFamily="34" charset="0"/>
+              <a:buChar char="•"/>
+            </a:pPr>
             <a:endParaRPr lang="en-US" altLang="pt-BR" sz="2800"/>
           </a:p>
           <a:p>
-            <a:endParaRPr lang="en-US" altLang="pt-BR" sz="2800"/>
-          </a:p>
-          <a:p>
+            <a:pPr marL="457200" indent="-457200">
+              <a:buFont typeface="Arial" panose="020B0604020202020204" pitchFamily="34" charset="0"/>
+              <a:buChar char="•"/>
+            </a:pPr>
             <a:endParaRPr lang="en-US" altLang="pt-BR" sz="2800"/>
           </a:p>
         </p:txBody>
@@ -7392,7 +7301,7 @@
         </p:nvSpPr>
         <p:spPr>
           <a:xfrm>
-            <a:off x="457200" y="441960"/>
+            <a:off x="457200" y="418465"/>
             <a:ext cx="8229600" cy="582613"/>
           </a:xfrm>
         </p:spPr>
@@ -7447,93 +7356,103 @@
       </p:sp>
       <p:sp>
         <p:nvSpPr>
-          <p:cNvPr id="6" name="Caixa de Texto 5"/>
-          <p:cNvSpPr txBox="1"/>
-          <p:nvPr/>
-        </p:nvSpPr>
-        <p:spPr>
-          <a:xfrm>
-            <a:off x="726440" y="1843405"/>
-            <a:ext cx="7689850" cy="2245360"/>
-          </a:xfrm>
-          <a:prstGeom prst="rect">
-            <a:avLst/>
-          </a:prstGeom>
-          <a:noFill/>
-        </p:spPr>
-        <p:txBody>
-          <a:bodyPr wrap="square" rtlCol="0">
-            <a:spAutoFit/>
-          </a:bodyPr>
-          <a:p>
-            <a:pPr marL="457200" indent="-457200">
-              <a:buFont typeface="Arial" panose="020B0604020202020204" pitchFamily="34" charset="0"/>
-              <a:buChar char="•"/>
-            </a:pPr>
-            <a:r>
-              <a:rPr lang="en-US" altLang="pt-BR" sz="2800">
-                <a:sym typeface="+mn-ea"/>
-              </a:rPr>
+          <p:cNvPr id="3" name="Espaço Reservado para Conteúdo 2"/>
+          <p:cNvSpPr>
+            <a:spLocks noGrp="1"/>
+          </p:cNvSpPr>
+          <p:nvPr>
+            <p:ph idx="1"/>
+          </p:nvPr>
+        </p:nvSpPr>
+        <p:spPr/>
+        <p:txBody>
+          <a:bodyPr/>
+          <a:p>
+            <a:endParaRPr lang="en-US" altLang="pt-BR" sz="2800"/>
+          </a:p>
+          <a:p>
+            <a:r>
+              <a:rPr lang="en-US" altLang="pt-BR" sz="2800"/>
               <a:t>Elementos futuros s</a:t>
             </a:r>
             <a:r>
-              <a:rPr lang="en-US" altLang="en-US" sz="2800">
-                <a:sym typeface="+mn-ea"/>
-              </a:rPr>
+              <a:rPr lang="en-US" altLang="en-US" sz="2800"/>
               <a:t>ã</a:t>
             </a:r>
             <a:r>
-              <a:rPr lang="en-US" altLang="pt-BR" sz="2800">
-                <a:sym typeface="+mn-ea"/>
-              </a:rPr>
-              <a:t>o capturados</a:t>
+              <a:rPr lang="en-US" altLang="pt-BR" sz="2800"/>
+              <a:t>o capturados:</a:t>
             </a:r>
             <a:endParaRPr lang="en-US" altLang="pt-BR" sz="2800"/>
           </a:p>
           <a:p>
-            <a:pPr marL="457200" indent="-457200">
-              <a:buFont typeface="Arial" panose="020B0604020202020204" pitchFamily="34" charset="0"/>
-              <a:buChar char="•"/>
-            </a:pPr>
+            <a:pPr marL="0" indent="457200">
+              <a:buNone/>
+            </a:pPr>
+            <a:r>
+              <a:rPr lang="en-US" altLang="pt-BR" sz="2800"/>
+              <a:t>Quando novos elementos s</a:t>
+            </a:r>
+            <a:r>
+              <a:rPr lang="en-US" altLang="en-US" sz="2800"/>
+              <a:t>ã</a:t>
+            </a:r>
+            <a:r>
+              <a:rPr lang="en-US" altLang="pt-BR" sz="2800"/>
+              <a:t>o adicionados ao DOM (por exemplo, via appendChild ou innerHTML), eles n</a:t>
+            </a:r>
+            <a:r>
+              <a:rPr lang="en-US" altLang="en-US" sz="2800"/>
+              <a:t>ã</a:t>
+            </a:r>
+            <a:r>
+              <a:rPr lang="en-US" altLang="pt-BR" sz="2800"/>
+              <a:t>o herdam automaticamente os manipuladores de eventos.</a:t>
+            </a:r>
             <a:endParaRPr lang="en-US" altLang="pt-BR" sz="2800"/>
           </a:p>
           <a:p>
-            <a:pPr marL="457200" indent="-457200">
-              <a:buFont typeface="Arial" panose="020B0604020202020204" pitchFamily="34" charset="0"/>
-              <a:buChar char="•"/>
-            </a:pPr>
-            <a:r>
-              <a:rPr lang="en-US" altLang="pt-BR" sz="2800">
-                <a:sym typeface="+mn-ea"/>
-              </a:rPr>
-              <a:t>Menor consumo de mem</a:t>
-            </a:r>
-            <a:r>
-              <a:rPr lang="en-US" altLang="en-US" sz="2800">
-                <a:sym typeface="+mn-ea"/>
-              </a:rPr>
-              <a:t>ó</a:t>
-            </a:r>
-            <a:r>
-              <a:rPr lang="en-US" altLang="pt-BR" sz="2800">
-                <a:sym typeface="+mn-ea"/>
-              </a:rPr>
-              <a:t>ria</a:t>
+            <a:pPr marL="0" indent="457200">
+              <a:buNone/>
+            </a:pPr>
+            <a:r>
+              <a:rPr lang="en-US" altLang="pt-BR" sz="2800"/>
+              <a:t>Com a delega</a:t>
+            </a:r>
+            <a:r>
+              <a:rPr lang="en-US" altLang="en-US" sz="2800"/>
+              <a:t>ç</a:t>
+            </a:r>
+            <a:r>
+              <a:rPr lang="en-US" altLang="en-US" sz="2800"/>
+              <a:t>ã</a:t>
+            </a:r>
+            <a:r>
+              <a:rPr lang="en-US" altLang="pt-BR" sz="2800"/>
+              <a:t>o de eventos, voc</a:t>
+            </a:r>
+            <a:r>
+              <a:rPr lang="en-US" altLang="en-US" sz="2800"/>
+              <a:t>ê</a:t>
+            </a:r>
+            <a:r>
+              <a:rPr lang="en-US" altLang="pt-BR" sz="2800"/>
+              <a:t> adiciona o manipulador em um elemento pai comum que j</a:t>
+            </a:r>
+            <a:r>
+              <a:rPr lang="en-US" altLang="en-US" sz="2800"/>
+              <a:t>á</a:t>
+            </a:r>
+            <a:r>
+              <a:rPr lang="en-US" altLang="pt-BR" sz="2800"/>
+              <a:t> existia. Esse manipulador pode "ouvir" os eventos disparados pelos novos elementos, pois o evento propaga para cima (bubbling).</a:t>
             </a:r>
             <a:endParaRPr lang="en-US" altLang="pt-BR" sz="2800"/>
           </a:p>
           <a:p>
-            <a:pPr marL="457200" indent="-457200">
-              <a:buFont typeface="Arial" panose="020B0604020202020204" pitchFamily="34" charset="0"/>
-              <a:buChar char="•"/>
-            </a:pPr>
             <a:endParaRPr lang="en-US" altLang="pt-BR" sz="2800"/>
           </a:p>
           <a:p>
-            <a:pPr marL="457200" indent="-457200">
-              <a:buFont typeface="Arial" panose="020B0604020202020204" pitchFamily="34" charset="0"/>
-              <a:buChar char="•"/>
-            </a:pPr>
             <a:endParaRPr lang="en-US" altLang="pt-BR" sz="2800"/>
           </a:p>
         </p:txBody>
@@ -7630,7 +7549,7 @@
         <p:spPr>
           <a:xfrm>
             <a:off x="726440" y="1843405"/>
-            <a:ext cx="7689850" cy="3969385"/>
+            <a:ext cx="7689850" cy="2245360"/>
           </a:xfrm>
           <a:prstGeom prst="rect">
             <a:avLst/>
@@ -7650,80 +7569,51 @@
               <a:rPr lang="en-US" altLang="pt-BR" sz="2800">
                 <a:sym typeface="+mn-ea"/>
               </a:rPr>
-              <a:t>Menor consumo de mem</a:t>
+              <a:t>Elementos futuros s</a:t>
             </a:r>
             <a:r>
               <a:rPr lang="en-US" altLang="en-US" sz="2800">
                 <a:sym typeface="+mn-ea"/>
               </a:rPr>
-              <a:t>ó</a:t>
+              <a:t>ã</a:t>
             </a:r>
             <a:r>
               <a:rPr lang="en-US" altLang="pt-BR" sz="2800">
                 <a:sym typeface="+mn-ea"/>
               </a:rPr>
-              <a:t>ria</a:t>
-            </a:r>
-            <a:endParaRPr lang="en-US" altLang="pt-BR" sz="2800">
-              <a:sym typeface="+mn-ea"/>
-            </a:endParaRPr>
+              <a:t>o capturados</a:t>
+            </a:r>
+            <a:endParaRPr lang="en-US" altLang="pt-BR" sz="2800"/>
           </a:p>
           <a:p>
             <a:pPr marL="457200" indent="-457200">
               <a:buFont typeface="Arial" panose="020B0604020202020204" pitchFamily="34" charset="0"/>
               <a:buChar char="•"/>
             </a:pPr>
-            <a:endParaRPr lang="en-US" altLang="pt-BR" sz="2800">
-              <a:sym typeface="+mn-ea"/>
-            </a:endParaRPr>
-          </a:p>
-          <a:p>
-            <a:pPr indent="457200">
-              <a:buNone/>
-            </a:pPr>
-            <a:r>
-              <a:rPr lang="en-US" altLang="pt-BR" sz="2800"/>
-              <a:t>Em vez de adicionar m</a:t>
-            </a:r>
-            <a:r>
-              <a:rPr lang="en-US" altLang="en-US" sz="2800"/>
-              <a:t>ú</a:t>
-            </a:r>
-            <a:r>
-              <a:rPr lang="en-US" altLang="pt-BR" sz="2800"/>
-              <a:t>ltiplos manipuladores de eventos para cada elemento individualmente, voc</a:t>
-            </a:r>
-            <a:r>
-              <a:rPr lang="en-US" altLang="en-US" sz="2800"/>
-              <a:t>ê</a:t>
-            </a:r>
-            <a:r>
-              <a:rPr lang="en-US" altLang="pt-BR" sz="2800"/>
-              <a:t> adiciona apenas um no cont</a:t>
-            </a:r>
-            <a:r>
-              <a:rPr lang="en-US" altLang="en-US" sz="2800"/>
-              <a:t>ê</a:t>
-            </a:r>
-            <a:r>
-              <a:rPr lang="en-US" altLang="pt-BR" sz="2800"/>
-              <a:t>iner pai. Isso economiza mem</a:t>
-            </a:r>
-            <a:r>
-              <a:rPr lang="en-US" altLang="en-US" sz="2800"/>
+            <a:endParaRPr lang="en-US" altLang="pt-BR" sz="2800"/>
+          </a:p>
+          <a:p>
+            <a:pPr marL="457200" indent="-457200">
+              <a:buFont typeface="Arial" panose="020B0604020202020204" pitchFamily="34" charset="0"/>
+              <a:buChar char="•"/>
+            </a:pPr>
+            <a:r>
+              <a:rPr lang="en-US" altLang="pt-BR" sz="2800">
+                <a:sym typeface="+mn-ea"/>
+              </a:rPr>
+              <a:t>Menor consumo de mem</a:t>
+            </a:r>
+            <a:r>
+              <a:rPr lang="en-US" altLang="en-US" sz="2800">
+                <a:sym typeface="+mn-ea"/>
+              </a:rPr>
               <a:t>ó</a:t>
             </a:r>
             <a:r>
-              <a:rPr lang="en-US" altLang="pt-BR" sz="2800"/>
-              <a:t>ria e reduz a complexidade do c</a:t>
-            </a:r>
-            <a:r>
-              <a:rPr lang="en-US" altLang="en-US" sz="2800"/>
-              <a:t>ó</a:t>
-            </a:r>
-            <a:r>
-              <a:rPr lang="en-US" altLang="pt-BR" sz="2800"/>
-              <a:t>digo.</a:t>
+              <a:rPr lang="en-US" altLang="pt-BR" sz="2800">
+                <a:sym typeface="+mn-ea"/>
+              </a:rPr>
+              <a:t>ria</a:t>
             </a:r>
             <a:endParaRPr lang="en-US" altLang="pt-BR" sz="2800"/>
           </a:p>
@@ -7835,7 +7725,7 @@
         <p:spPr>
           <a:xfrm>
             <a:off x="726440" y="1843405"/>
-            <a:ext cx="7689850" cy="3107690"/>
+            <a:ext cx="7689850" cy="3969385"/>
           </a:xfrm>
           <a:prstGeom prst="rect">
             <a:avLst/>
@@ -7855,37 +7745,64 @@
               <a:rPr lang="en-US" altLang="pt-BR" sz="2800">
                 <a:sym typeface="+mn-ea"/>
               </a:rPr>
-              <a:t>Elementos futuros s</a:t>
+              <a:t>Menor consumo de mem</a:t>
             </a:r>
             <a:r>
               <a:rPr lang="en-US" altLang="en-US" sz="2800">
                 <a:sym typeface="+mn-ea"/>
               </a:rPr>
-              <a:t>ã</a:t>
+              <a:t>ó</a:t>
             </a:r>
             <a:r>
               <a:rPr lang="en-US" altLang="pt-BR" sz="2800">
                 <a:sym typeface="+mn-ea"/>
               </a:rPr>
-              <a:t>o capturados</a:t>
-            </a:r>
-            <a:endParaRPr lang="en-US" altLang="pt-BR" sz="2800"/>
+              <a:t>ria</a:t>
+            </a:r>
+            <a:endParaRPr lang="en-US" altLang="pt-BR" sz="2800">
+              <a:sym typeface="+mn-ea"/>
+            </a:endParaRPr>
           </a:p>
           <a:p>
             <a:pPr marL="457200" indent="-457200">
               <a:buFont typeface="Arial" panose="020B0604020202020204" pitchFamily="34" charset="0"/>
               <a:buChar char="•"/>
             </a:pPr>
-            <a:endParaRPr lang="en-US" altLang="pt-BR" sz="2800"/>
-          </a:p>
-          <a:p>
-            <a:pPr marL="457200" indent="-457200">
-              <a:buFont typeface="Arial" panose="020B0604020202020204" pitchFamily="34" charset="0"/>
-              <a:buChar char="•"/>
+            <a:endParaRPr lang="en-US" altLang="pt-BR" sz="2800">
+              <a:sym typeface="+mn-ea"/>
+            </a:endParaRPr>
+          </a:p>
+          <a:p>
+            <a:pPr indent="457200">
+              <a:buNone/>
             </a:pPr>
             <a:r>
               <a:rPr lang="en-US" altLang="pt-BR" sz="2800"/>
-              <a:t>Menor consumo de mem</a:t>
+              <a:t>Em vez de adicionar m</a:t>
+            </a:r>
+            <a:r>
+              <a:rPr lang="en-US" altLang="en-US" sz="2800"/>
+              <a:t>ú</a:t>
+            </a:r>
+            <a:r>
+              <a:rPr lang="en-US" altLang="pt-BR" sz="2800"/>
+              <a:t>ltiplos manipuladores de eventos para cada elemento individualmente, voc</a:t>
+            </a:r>
+            <a:r>
+              <a:rPr lang="en-US" altLang="en-US" sz="2800"/>
+              <a:t>ê</a:t>
+            </a:r>
+            <a:r>
+              <a:rPr lang="en-US" altLang="pt-BR" sz="2800"/>
+              <a:t> adiciona apenas um no cont</a:t>
+            </a:r>
+            <a:r>
+              <a:rPr lang="en-US" altLang="en-US" sz="2800"/>
+              <a:t>ê</a:t>
+            </a:r>
+            <a:r>
+              <a:rPr lang="en-US" altLang="pt-BR" sz="2800"/>
+              <a:t>iner pai. Isso economiza mem</a:t>
             </a:r>
             <a:r>
               <a:rPr lang="en-US" altLang="en-US" sz="2800"/>
@@ -7893,25 +7810,7 @@
             </a:r>
             <a:r>
               <a:rPr lang="en-US" altLang="pt-BR" sz="2800"/>
-              <a:t>ria:</a:t>
-            </a:r>
-            <a:endParaRPr lang="en-US" altLang="pt-BR" sz="2800"/>
-          </a:p>
-          <a:p>
-            <a:pPr marL="457200" indent="-457200">
-              <a:buFont typeface="Arial" panose="020B0604020202020204" pitchFamily="34" charset="0"/>
-              <a:buChar char="•"/>
-            </a:pPr>
-            <a:endParaRPr lang="en-US" altLang="pt-BR" sz="2800"/>
-          </a:p>
-          <a:p>
-            <a:pPr marL="457200" indent="-457200">
-              <a:buFont typeface="Arial" panose="020B0604020202020204" pitchFamily="34" charset="0"/>
-              <a:buChar char="•"/>
-            </a:pPr>
-            <a:r>
-              <a:rPr lang="en-US" altLang="pt-BR" sz="2800"/>
-              <a:t>C</a:t>
+              <a:t>ria e reduz a complexidade do c</a:t>
             </a:r>
             <a:r>
               <a:rPr lang="en-US" altLang="en-US" sz="2800"/>
@@ -7919,15 +7818,7 @@
             </a:r>
             <a:r>
               <a:rPr lang="en-US" altLang="pt-BR" sz="2800"/>
-              <a:t>digo mais simples e f</a:t>
-            </a:r>
-            <a:r>
-              <a:rPr lang="en-US" altLang="en-US" sz="2800"/>
-              <a:t>á</a:t>
-            </a:r>
-            <a:r>
-              <a:rPr lang="en-US" altLang="pt-BR" sz="2800"/>
-              <a:t>cil de manter:</a:t>
+              <a:t>digo.</a:t>
             </a:r>
             <a:endParaRPr lang="en-US" altLang="pt-BR" sz="2800"/>
           </a:p>
@@ -8039,7 +7930,7 @@
         <p:spPr>
           <a:xfrm>
             <a:off x="726440" y="1843405"/>
-            <a:ext cx="7689850" cy="2676525"/>
+            <a:ext cx="7689850" cy="3107690"/>
           </a:xfrm>
           <a:prstGeom prst="rect">
             <a:avLst/>
@@ -8059,106 +7950,95 @@
               <a:rPr lang="en-US" altLang="pt-BR" sz="2800">
                 <a:sym typeface="+mn-ea"/>
               </a:rPr>
+              <a:t>Elementos futuros s</a:t>
+            </a:r>
+            <a:r>
+              <a:rPr lang="en-US" altLang="en-US" sz="2800">
+                <a:sym typeface="+mn-ea"/>
+              </a:rPr>
+              <a:t>ã</a:t>
+            </a:r>
+            <a:r>
+              <a:rPr lang="en-US" altLang="pt-BR" sz="2800">
+                <a:sym typeface="+mn-ea"/>
+              </a:rPr>
+              <a:t>o capturados</a:t>
+            </a:r>
+            <a:endParaRPr lang="en-US" altLang="pt-BR" sz="2800"/>
+          </a:p>
+          <a:p>
+            <a:pPr marL="457200" indent="-457200">
+              <a:buFont typeface="Arial" panose="020B0604020202020204" pitchFamily="34" charset="0"/>
+              <a:buChar char="•"/>
+            </a:pPr>
+            <a:endParaRPr lang="en-US" altLang="pt-BR" sz="2800"/>
+          </a:p>
+          <a:p>
+            <a:pPr marL="457200" indent="-457200">
+              <a:buFont typeface="Arial" panose="020B0604020202020204" pitchFamily="34" charset="0"/>
+              <a:buChar char="•"/>
+            </a:pPr>
+            <a:r>
+              <a:rPr lang="en-US" altLang="pt-BR" sz="2800"/>
+              <a:t>Menor consumo de mem</a:t>
+            </a:r>
+            <a:r>
+              <a:rPr lang="en-US" altLang="en-US" sz="2800"/>
+              <a:t>ó</a:t>
+            </a:r>
+            <a:r>
+              <a:rPr lang="en-US" altLang="pt-BR" sz="2800"/>
+              <a:t>ria:</a:t>
+            </a:r>
+            <a:endParaRPr lang="en-US" altLang="pt-BR" sz="2800"/>
+          </a:p>
+          <a:p>
+            <a:pPr marL="457200" indent="-457200">
+              <a:buFont typeface="Arial" panose="020B0604020202020204" pitchFamily="34" charset="0"/>
+              <a:buChar char="•"/>
+            </a:pPr>
+            <a:endParaRPr lang="en-US" altLang="pt-BR" sz="2800"/>
+          </a:p>
+          <a:p>
+            <a:pPr marL="457200" indent="-457200">
+              <a:buFont typeface="Arial" panose="020B0604020202020204" pitchFamily="34" charset="0"/>
+              <a:buChar char="•"/>
+            </a:pPr>
+            <a:r>
+              <a:rPr lang="en-US" altLang="pt-BR" sz="2800"/>
               <a:t>C</a:t>
             </a:r>
             <a:r>
-              <a:rPr lang="en-US" altLang="en-US" sz="2800">
-                <a:sym typeface="+mn-ea"/>
-              </a:rPr>
+              <a:rPr lang="en-US" altLang="en-US" sz="2800"/>
               <a:t>ó</a:t>
             </a:r>
             <a:r>
-              <a:rPr lang="en-US" altLang="pt-BR" sz="2800">
-                <a:sym typeface="+mn-ea"/>
-              </a:rPr>
+              <a:rPr lang="en-US" altLang="pt-BR" sz="2800"/>
               <a:t>digo mais simples e f</a:t>
             </a:r>
             <a:r>
-              <a:rPr lang="en-US" altLang="en-US" sz="2800">
-                <a:sym typeface="+mn-ea"/>
-              </a:rPr>
+              <a:rPr lang="en-US" altLang="en-US" sz="2800"/>
               <a:t>á</a:t>
             </a:r>
             <a:r>
-              <a:rPr lang="en-US" altLang="pt-BR" sz="2800">
-                <a:sym typeface="+mn-ea"/>
-              </a:rPr>
-              <a:t>cil de manter</a:t>
-            </a:r>
-            <a:r>
-              <a:rPr lang="pt-BR" altLang="en-US" sz="2800">
-                <a:sym typeface="+mn-ea"/>
-              </a:rPr>
-              <a:t>:</a:t>
-            </a:r>
-            <a:endParaRPr lang="pt-BR" altLang="en-US" sz="2800">
-              <a:sym typeface="+mn-ea"/>
-            </a:endParaRPr>
-          </a:p>
-          <a:p>
-            <a:endParaRPr lang="pt-BR" altLang="en-US" sz="2800">
-              <a:sym typeface="+mn-ea"/>
-            </a:endParaRPr>
-          </a:p>
-          <a:p>
-            <a:pPr indent="457200"/>
-            <a:r>
-              <a:rPr lang="en-US" altLang="pt-BR" sz="2800">
-                <a:sym typeface="+mn-ea"/>
-              </a:rPr>
-              <a:t>Em vez de rastrear quais elementos precisam de eventos associados, voc</a:t>
-            </a:r>
-            <a:r>
-              <a:rPr lang="en-US" altLang="en-US" sz="2800">
-                <a:sym typeface="+mn-ea"/>
-              </a:rPr>
-              <a:t>ê</a:t>
-            </a:r>
-            <a:r>
-              <a:rPr lang="en-US" altLang="pt-BR" sz="2800">
-                <a:sym typeface="+mn-ea"/>
-              </a:rPr>
-              <a:t> escreve uma l</a:t>
-            </a:r>
-            <a:r>
-              <a:rPr lang="en-US" altLang="en-US" sz="2800">
-                <a:sym typeface="+mn-ea"/>
-              </a:rPr>
-              <a:t>ó</a:t>
-            </a:r>
-            <a:r>
-              <a:rPr lang="en-US" altLang="pt-BR" sz="2800">
-                <a:sym typeface="+mn-ea"/>
-              </a:rPr>
-              <a:t>gica </a:t>
-            </a:r>
-            <a:r>
-              <a:rPr lang="en-US" altLang="en-US" sz="2800">
-                <a:sym typeface="+mn-ea"/>
-              </a:rPr>
-              <a:t>ú</a:t>
-            </a:r>
-            <a:r>
-              <a:rPr lang="en-US" altLang="pt-BR" sz="2800">
-                <a:sym typeface="+mn-ea"/>
-              </a:rPr>
-              <a:t>nica no cont</a:t>
-            </a:r>
-            <a:r>
-              <a:rPr lang="en-US" altLang="en-US" sz="2800">
-                <a:sym typeface="+mn-ea"/>
-              </a:rPr>
-              <a:t>ê</a:t>
-            </a:r>
-            <a:r>
-              <a:rPr lang="en-US" altLang="pt-BR" sz="2800">
-                <a:sym typeface="+mn-ea"/>
-              </a:rPr>
-              <a:t>iner pai que trata os eventos para todos os elementos filhos.</a:t>
-            </a:r>
-            <a:endParaRPr lang="en-US" altLang="pt-BR" sz="2800">
-              <a:sym typeface="+mn-ea"/>
-            </a:endParaRPr>
+              <a:rPr lang="en-US" altLang="pt-BR" sz="2800"/>
+              <a:t>cil de manter:</a:t>
+            </a:r>
+            <a:endParaRPr lang="en-US" altLang="pt-BR" sz="2800"/>
+          </a:p>
+          <a:p>
+            <a:pPr marL="457200" indent="-457200">
+              <a:buFont typeface="Arial" panose="020B0604020202020204" pitchFamily="34" charset="0"/>
+              <a:buChar char="•"/>
+            </a:pPr>
+            <a:endParaRPr lang="en-US" altLang="pt-BR" sz="2800"/>
+          </a:p>
+          <a:p>
+            <a:pPr marL="457200" indent="-457200">
+              <a:buFont typeface="Arial" panose="020B0604020202020204" pitchFamily="34" charset="0"/>
+              <a:buChar char="•"/>
+            </a:pPr>
+            <a:endParaRPr lang="en-US" altLang="pt-BR" sz="2800"/>
           </a:p>
         </p:txBody>
       </p:sp>
@@ -8171,6 +8051,221 @@
 </file>
 
 <file path=ppt/slides/slide28.xml><?xml version="1.0" encoding="utf-8"?>
+<p:sld xmlns:a="http://schemas.openxmlformats.org/drawingml/2006/main" xmlns:r="http://schemas.openxmlformats.org/officeDocument/2006/relationships" xmlns:p="http://schemas.openxmlformats.org/presentationml/2006/main">
+  <p:cSld>
+    <p:spTree>
+      <p:nvGrpSpPr>
+        <p:cNvPr id="1" name=""/>
+        <p:cNvGrpSpPr/>
+        <p:nvPr/>
+      </p:nvGrpSpPr>
+      <p:grpSpPr/>
+      <p:sp>
+        <p:nvSpPr>
+          <p:cNvPr id="2" name="Título 1"/>
+          <p:cNvSpPr>
+            <a:spLocks noGrp="1"/>
+          </p:cNvSpPr>
+          <p:nvPr>
+            <p:ph type="title"/>
+          </p:nvPr>
+        </p:nvSpPr>
+        <p:spPr>
+          <a:xfrm>
+            <a:off x="457200" y="441960"/>
+            <a:ext cx="8229600" cy="582613"/>
+          </a:xfrm>
+        </p:spPr>
+        <p:txBody>
+          <a:bodyPr/>
+          <a:p>
+            <a:r>
+              <a:rPr lang="en-US" altLang="pt-BR">
+                <a:sym typeface="+mn-ea"/>
+              </a:rPr>
+              <a:t>Por que a delega</a:t>
+            </a:r>
+            <a:r>
+              <a:rPr lang="en-US" altLang="en-US">
+                <a:sym typeface="+mn-ea"/>
+              </a:rPr>
+              <a:t>çã</a:t>
+            </a:r>
+            <a:r>
+              <a:rPr lang="en-US" altLang="pt-BR">
+                <a:sym typeface="+mn-ea"/>
+              </a:rPr>
+              <a:t>o de eventos </a:t>
+            </a:r>
+            <a:r>
+              <a:rPr lang="en-US" altLang="en-US">
+                <a:sym typeface="+mn-ea"/>
+              </a:rPr>
+              <a:t>é</a:t>
+            </a:r>
+            <a:r>
+              <a:rPr lang="en-US" altLang="pt-BR">
+                <a:sym typeface="+mn-ea"/>
+              </a:rPr>
+              <a:t> </a:t>
+            </a:r>
+            <a:r>
+              <a:rPr lang="en-US" altLang="en-US">
+                <a:sym typeface="+mn-ea"/>
+              </a:rPr>
+              <a:t>ú</a:t>
+            </a:r>
+            <a:r>
+              <a:rPr lang="en-US" altLang="pt-BR">
+                <a:sym typeface="+mn-ea"/>
+              </a:rPr>
+              <a:t>til para elementos criados dinamicamente?</a:t>
+            </a:r>
+            <a:endParaRPr lang="pt-BR" altLang="en-US"/>
+          </a:p>
+        </p:txBody>
+      </p:sp>
+      <p:sp>
+        <p:nvSpPr>
+          <p:cNvPr id="6" name="Caixa de Texto 5"/>
+          <p:cNvSpPr txBox="1"/>
+          <p:nvPr/>
+        </p:nvSpPr>
+        <p:spPr>
+          <a:xfrm>
+            <a:off x="726440" y="1843405"/>
+            <a:ext cx="7689850" cy="2676525"/>
+          </a:xfrm>
+          <a:prstGeom prst="rect">
+            <a:avLst/>
+          </a:prstGeom>
+          <a:noFill/>
+        </p:spPr>
+        <p:txBody>
+          <a:bodyPr wrap="square" rtlCol="0">
+            <a:spAutoFit/>
+          </a:bodyPr>
+          <a:p>
+            <a:pPr marL="457200" indent="-457200">
+              <a:buFont typeface="Arial" panose="020B0604020202020204" pitchFamily="34" charset="0"/>
+              <a:buChar char="•"/>
+            </a:pPr>
+            <a:r>
+              <a:rPr lang="en-US" altLang="pt-BR" sz="2800">
+                <a:sym typeface="+mn-ea"/>
+              </a:rPr>
+              <a:t>C</a:t>
+            </a:r>
+            <a:r>
+              <a:rPr lang="en-US" altLang="en-US" sz="2800">
+                <a:sym typeface="+mn-ea"/>
+              </a:rPr>
+              <a:t>ó</a:t>
+            </a:r>
+            <a:r>
+              <a:rPr lang="en-US" altLang="pt-BR" sz="2800">
+                <a:sym typeface="+mn-ea"/>
+              </a:rPr>
+              <a:t>digo mais simples e f</a:t>
+            </a:r>
+            <a:r>
+              <a:rPr lang="en-US" altLang="en-US" sz="2800">
+                <a:sym typeface="+mn-ea"/>
+              </a:rPr>
+              <a:t>á</a:t>
+            </a:r>
+            <a:r>
+              <a:rPr lang="en-US" altLang="pt-BR" sz="2800">
+                <a:sym typeface="+mn-ea"/>
+              </a:rPr>
+              <a:t>cil de manter</a:t>
+            </a:r>
+            <a:r>
+              <a:rPr lang="pt-BR" altLang="en-US" sz="2800">
+                <a:sym typeface="+mn-ea"/>
+              </a:rPr>
+              <a:t>:</a:t>
+            </a:r>
+            <a:endParaRPr lang="pt-BR" altLang="en-US" sz="2800">
+              <a:sym typeface="+mn-ea"/>
+            </a:endParaRPr>
+          </a:p>
+          <a:p>
+            <a:endParaRPr lang="pt-BR" altLang="en-US" sz="2800">
+              <a:sym typeface="+mn-ea"/>
+            </a:endParaRPr>
+          </a:p>
+          <a:p>
+            <a:pPr indent="457200"/>
+            <a:r>
+              <a:rPr lang="en-US" altLang="pt-BR" sz="2800">
+                <a:sym typeface="+mn-ea"/>
+              </a:rPr>
+              <a:t>Em vez de rastrear quais elementos precisam de eventos associados, voc</a:t>
+            </a:r>
+            <a:r>
+              <a:rPr lang="en-US" altLang="en-US" sz="2800">
+                <a:sym typeface="+mn-ea"/>
+              </a:rPr>
+              <a:t>ê</a:t>
+            </a:r>
+            <a:r>
+              <a:rPr lang="en-US" altLang="pt-BR" sz="2800">
+                <a:sym typeface="+mn-ea"/>
+              </a:rPr>
+              <a:t> escreve uma l</a:t>
+            </a:r>
+            <a:r>
+              <a:rPr lang="en-US" altLang="en-US" sz="2800">
+                <a:sym typeface="+mn-ea"/>
+              </a:rPr>
+              <a:t>ó</a:t>
+            </a:r>
+            <a:r>
+              <a:rPr lang="en-US" altLang="pt-BR" sz="2800">
+                <a:sym typeface="+mn-ea"/>
+              </a:rPr>
+              <a:t>gica </a:t>
+            </a:r>
+            <a:r>
+              <a:rPr lang="en-US" altLang="en-US" sz="2800">
+                <a:sym typeface="+mn-ea"/>
+              </a:rPr>
+              <a:t>ú</a:t>
+            </a:r>
+            <a:r>
+              <a:rPr lang="en-US" altLang="pt-BR" sz="2800">
+                <a:sym typeface="+mn-ea"/>
+              </a:rPr>
+              <a:t>nica no cont</a:t>
+            </a:r>
+            <a:r>
+              <a:rPr lang="en-US" altLang="en-US" sz="2800">
+                <a:sym typeface="+mn-ea"/>
+              </a:rPr>
+              <a:t>ê</a:t>
+            </a:r>
+            <a:r>
+              <a:rPr lang="en-US" altLang="pt-BR" sz="2800">
+                <a:sym typeface="+mn-ea"/>
+              </a:rPr>
+              <a:t>iner pai que trata os eventos para todos os elementos filhos.</a:t>
+            </a:r>
+            <a:endParaRPr lang="en-US" altLang="pt-BR" sz="2800">
+              <a:sym typeface="+mn-ea"/>
+            </a:endParaRPr>
+          </a:p>
+        </p:txBody>
+      </p:sp>
+    </p:spTree>
+  </p:cSld>
+  <p:clrMapOvr>
+    <a:masterClrMapping/>
+  </p:clrMapOvr>
+</p:sld>
+</file>
+
+<file path=ppt/slides/slide29.xml><?xml version="1.0" encoding="utf-8"?>
 <p:sld xmlns:a="http://schemas.openxmlformats.org/drawingml/2006/main" xmlns:r="http://schemas.openxmlformats.org/officeDocument/2006/relationships" xmlns:p="http://schemas.openxmlformats.org/presentationml/2006/main">
   <p:cSld>
     <p:spTree>
@@ -8305,7 +8400,124 @@
 </p:sld>
 </file>
 
-<file path=ppt/slides/slide29.xml><?xml version="1.0" encoding="utf-8"?>
+<file path=ppt/slides/slide3.xml><?xml version="1.0" encoding="utf-8"?>
+<p:sld xmlns:a="http://schemas.openxmlformats.org/drawingml/2006/main" xmlns:r="http://schemas.openxmlformats.org/officeDocument/2006/relationships" xmlns:p="http://schemas.openxmlformats.org/presentationml/2006/main">
+  <p:cSld>
+    <p:spTree>
+      <p:nvGrpSpPr>
+        <p:cNvPr id="1" name=""/>
+        <p:cNvGrpSpPr/>
+        <p:nvPr/>
+      </p:nvGrpSpPr>
+      <p:grpSpPr/>
+      <p:sp>
+        <p:nvSpPr>
+          <p:cNvPr id="2" name="Título 1"/>
+          <p:cNvSpPr>
+            <a:spLocks noGrp="1"/>
+          </p:cNvSpPr>
+          <p:nvPr>
+            <p:ph type="title"/>
+          </p:nvPr>
+        </p:nvSpPr>
+        <p:spPr/>
+        <p:txBody>
+          <a:bodyPr/>
+          <a:p>
+            <a:r>
+              <a:rPr>
+                <a:sym typeface="+mn-ea"/>
+              </a:rPr>
+              <a:t>Principais características:</a:t>
+            </a:r>
+            <a:endParaRPr lang="pt-BR" altLang="en-US"/>
+          </a:p>
+        </p:txBody>
+      </p:sp>
+      <p:pic>
+        <p:nvPicPr>
+          <p:cNvPr id="6" name="Espaço Reservado para Conteúdo 5" descr="DOMtree"/>
+          <p:cNvPicPr>
+            <a:picLocks noChangeAspect="1"/>
+          </p:cNvPicPr>
+          <p:nvPr>
+            <p:ph idx="1"/>
+          </p:nvPr>
+        </p:nvPicPr>
+        <p:blipFill>
+          <a:blip r:embed="rId1"/>
+          <a:stretch>
+            <a:fillRect/>
+          </a:stretch>
+        </p:blipFill>
+        <p:spPr>
+          <a:xfrm>
+            <a:off x="3002280" y="2632710"/>
+            <a:ext cx="4729480" cy="3932555"/>
+          </a:xfrm>
+          <a:prstGeom prst="rect">
+            <a:avLst/>
+          </a:prstGeom>
+        </p:spPr>
+      </p:pic>
+      <p:sp>
+        <p:nvSpPr>
+          <p:cNvPr id="7" name="Caixa de Texto 6"/>
+          <p:cNvSpPr txBox="1"/>
+          <p:nvPr/>
+        </p:nvSpPr>
+        <p:spPr>
+          <a:xfrm>
+            <a:off x="670560" y="1287780"/>
+            <a:ext cx="4572000" cy="1476375"/>
+          </a:xfrm>
+          <a:prstGeom prst="rect">
+            <a:avLst/>
+          </a:prstGeom>
+          <a:noFill/>
+        </p:spPr>
+        <p:txBody>
+          <a:bodyPr wrap="square" rtlCol="0" anchor="t">
+            <a:spAutoFit/>
+          </a:bodyPr>
+          <a:p>
+            <a:r>
+              <a:rPr>
+                <a:sym typeface="+mn-ea"/>
+              </a:rPr>
+              <a:t>- Representa a página como uma árvore de objetos.</a:t>
+            </a:r>
+            <a:endParaRPr>
+              <a:sym typeface="+mn-ea"/>
+            </a:endParaRPr>
+          </a:p>
+          <a:p>
+            <a:endParaRPr lang="pt-BR" altLang="en-US">
+              <a:sym typeface="+mn-ea"/>
+            </a:endParaRPr>
+          </a:p>
+          <a:p>
+            <a:r>
+              <a:rPr lang="en-US" altLang="pt-BR">
+                <a:sym typeface="+mn-ea"/>
+              </a:rPr>
+              <a:t>- Permite acessar e manipular elementos dinamicamente</a:t>
+            </a:r>
+            <a:endParaRPr lang="en-US" altLang="pt-BR">
+              <a:sym typeface="+mn-ea"/>
+            </a:endParaRPr>
+          </a:p>
+        </p:txBody>
+      </p:sp>
+    </p:spTree>
+  </p:cSld>
+  <p:clrMapOvr>
+    <a:masterClrMapping/>
+  </p:clrMapOvr>
+</p:sld>
+</file>
+
+<file path=ppt/slides/slide30.xml><?xml version="1.0" encoding="utf-8"?>
 <p:sld xmlns:a="http://schemas.openxmlformats.org/drawingml/2006/main" xmlns:r="http://schemas.openxmlformats.org/officeDocument/2006/relationships" xmlns:p="http://schemas.openxmlformats.org/presentationml/2006/main">
   <p:cSld>
     <p:spTree>
@@ -8440,231 +8652,6 @@
 </p:sld>
 </file>
 
-<file path=ppt/slides/slide3.xml><?xml version="1.0" encoding="utf-8"?>
-<p:sld xmlns:a="http://schemas.openxmlformats.org/drawingml/2006/main" xmlns:r="http://schemas.openxmlformats.org/officeDocument/2006/relationships" xmlns:p="http://schemas.openxmlformats.org/presentationml/2006/main">
-  <p:cSld>
-    <p:spTree>
-      <p:nvGrpSpPr>
-        <p:cNvPr id="1" name=""/>
-        <p:cNvGrpSpPr/>
-        <p:nvPr/>
-      </p:nvGrpSpPr>
-      <p:grpSpPr/>
-      <p:sp>
-        <p:nvSpPr>
-          <p:cNvPr id="2" name="Título 1"/>
-          <p:cNvSpPr>
-            <a:spLocks noGrp="1"/>
-          </p:cNvSpPr>
-          <p:nvPr>
-            <p:ph type="title"/>
-          </p:nvPr>
-        </p:nvSpPr>
-        <p:spPr/>
-        <p:txBody>
-          <a:bodyPr/>
-          <a:p>
-            <a:r>
-              <a:rPr>
-                <a:sym typeface="+mn-ea"/>
-              </a:rPr>
-              <a:t>Principais características:</a:t>
-            </a:r>
-            <a:endParaRPr lang="pt-BR" altLang="en-US"/>
-          </a:p>
-        </p:txBody>
-      </p:sp>
-      <p:pic>
-        <p:nvPicPr>
-          <p:cNvPr id="6" name="Espaço Reservado para Conteúdo 5" descr="DOMtree"/>
-          <p:cNvPicPr>
-            <a:picLocks noChangeAspect="1"/>
-          </p:cNvPicPr>
-          <p:nvPr>
-            <p:ph idx="1"/>
-          </p:nvPr>
-        </p:nvPicPr>
-        <p:blipFill>
-          <a:blip r:embed="rId1"/>
-          <a:stretch>
-            <a:fillRect/>
-          </a:stretch>
-        </p:blipFill>
-        <p:spPr>
-          <a:xfrm>
-            <a:off x="3002280" y="2632710"/>
-            <a:ext cx="4729480" cy="3932555"/>
-          </a:xfrm>
-          <a:prstGeom prst="rect">
-            <a:avLst/>
-          </a:prstGeom>
-        </p:spPr>
-      </p:pic>
-      <p:sp>
-        <p:nvSpPr>
-          <p:cNvPr id="7" name="Caixa de Texto 6"/>
-          <p:cNvSpPr txBox="1"/>
-          <p:nvPr/>
-        </p:nvSpPr>
-        <p:spPr>
-          <a:xfrm>
-            <a:off x="670560" y="1287780"/>
-            <a:ext cx="4572000" cy="1476375"/>
-          </a:xfrm>
-          <a:prstGeom prst="rect">
-            <a:avLst/>
-          </a:prstGeom>
-          <a:noFill/>
-        </p:spPr>
-        <p:txBody>
-          <a:bodyPr wrap="square" rtlCol="0" anchor="t">
-            <a:spAutoFit/>
-          </a:bodyPr>
-          <a:p>
-            <a:r>
-              <a:rPr>
-                <a:sym typeface="+mn-ea"/>
-              </a:rPr>
-              <a:t>- Representa a página como uma árvore de objetos.</a:t>
-            </a:r>
-            <a:endParaRPr>
-              <a:sym typeface="+mn-ea"/>
-            </a:endParaRPr>
-          </a:p>
-          <a:p>
-            <a:endParaRPr lang="pt-BR" altLang="en-US">
-              <a:sym typeface="+mn-ea"/>
-            </a:endParaRPr>
-          </a:p>
-          <a:p>
-            <a:r>
-              <a:rPr lang="en-US" altLang="pt-BR">
-                <a:sym typeface="+mn-ea"/>
-              </a:rPr>
-              <a:t>- Permite acessar e manipular elementos dinamicamente</a:t>
-            </a:r>
-            <a:endParaRPr lang="en-US" altLang="pt-BR">
-              <a:sym typeface="+mn-ea"/>
-            </a:endParaRPr>
-          </a:p>
-        </p:txBody>
-      </p:sp>
-    </p:spTree>
-  </p:cSld>
-  <p:clrMapOvr>
-    <a:masterClrMapping/>
-  </p:clrMapOvr>
-</p:sld>
-</file>
-
-<file path=ppt/slides/slide30.xml><?xml version="1.0" encoding="utf-8"?>
-<p:sld xmlns:a="http://schemas.openxmlformats.org/drawingml/2006/main" xmlns:r="http://schemas.openxmlformats.org/officeDocument/2006/relationships" xmlns:p="http://schemas.openxmlformats.org/presentationml/2006/main">
-  <p:cSld>
-    <p:spTree>
-      <p:nvGrpSpPr>
-        <p:cNvPr id="1" name=""/>
-        <p:cNvGrpSpPr/>
-        <p:nvPr/>
-      </p:nvGrpSpPr>
-      <p:grpSpPr/>
-      <p:sp>
-        <p:nvSpPr>
-          <p:cNvPr id="2" name="Título 1"/>
-          <p:cNvSpPr>
-            <a:spLocks noGrp="1"/>
-          </p:cNvSpPr>
-          <p:nvPr>
-            <p:ph type="title"/>
-          </p:nvPr>
-        </p:nvSpPr>
-        <p:spPr/>
-        <p:txBody>
-          <a:bodyPr/>
-          <a:p>
-            <a:r>
-              <a:rPr lang="en-US" altLang="pt-BR"/>
-              <a:t>Quando u</a:t>
-            </a:r>
-            <a:r>
-              <a:rPr lang="pt-BR" altLang="en-US"/>
-              <a:t>sar?</a:t>
-            </a:r>
-            <a:endParaRPr lang="pt-BR" altLang="en-US"/>
-          </a:p>
-        </p:txBody>
-      </p:sp>
-      <p:sp>
-        <p:nvSpPr>
-          <p:cNvPr id="3" name="Espaço Reservado para Conteúdo 2"/>
-          <p:cNvSpPr>
-            <a:spLocks noGrp="1"/>
-          </p:cNvSpPr>
-          <p:nvPr>
-            <p:ph idx="1"/>
-          </p:nvPr>
-        </p:nvSpPr>
-        <p:spPr/>
-        <p:txBody>
-          <a:bodyPr/>
-          <a:p>
-            <a:r>
-              <a:rPr lang="en-US" altLang="pt-BR"/>
-              <a:t>Listas ou tabelas com muitos itens.</a:t>
-            </a:r>
-            <a:endParaRPr lang="en-US" altLang="pt-BR"/>
-          </a:p>
-          <a:p>
-            <a:endParaRPr lang="en-US" altLang="pt-BR"/>
-          </a:p>
-          <a:p>
-            <a:r>
-              <a:rPr lang="en-US" altLang="pt-BR"/>
-              <a:t>Elementos que s</a:t>
-            </a:r>
-            <a:r>
-              <a:rPr lang="en-US" altLang="en-US"/>
-              <a:t>ã</a:t>
-            </a:r>
-            <a:r>
-              <a:rPr lang="en-US" altLang="pt-BR"/>
-              <a:t>o adicionados ou removidos dinamicamente ao DOM.</a:t>
-            </a:r>
-            <a:endParaRPr lang="en-US" altLang="pt-BR"/>
-          </a:p>
-          <a:p>
-            <a:endParaRPr lang="en-US" altLang="pt-BR"/>
-          </a:p>
-          <a:p>
-            <a:r>
-              <a:rPr lang="en-US" altLang="pt-BR"/>
-              <a:t>Sempre que quiser evitar m</a:t>
-            </a:r>
-            <a:r>
-              <a:rPr lang="en-US" altLang="en-US"/>
-              <a:t>ú</a:t>
-            </a:r>
-            <a:r>
-              <a:rPr lang="en-US" altLang="pt-BR"/>
-              <a:t>ltiplos manipuladores de eventos no mesmo conjunto de elementos.</a:t>
-            </a:r>
-            <a:endParaRPr lang="en-US" altLang="pt-BR"/>
-          </a:p>
-          <a:p>
-            <a:pPr marL="0" indent="0">
-              <a:buNone/>
-            </a:pPr>
-            <a:endParaRPr lang="en-US" altLang="pt-BR"/>
-          </a:p>
-        </p:txBody>
-      </p:sp>
-    </p:spTree>
-  </p:cSld>
-  <p:clrMapOvr>
-    <a:masterClrMapping/>
-  </p:clrMapOvr>
-</p:sld>
-</file>
-
 <file path=ppt/slides/slide31.xml><?xml version="1.0" encoding="utf-8"?>
 <p:sld xmlns:a="http://schemas.openxmlformats.org/drawingml/2006/main" xmlns:r="http://schemas.openxmlformats.org/officeDocument/2006/relationships" xmlns:p="http://schemas.openxmlformats.org/presentationml/2006/main">
   <p:cSld>
@@ -8691,31 +8678,13 @@
           <a:p>
             <a:r>
               <a:rPr lang="en-US" altLang="pt-BR"/>
-              <a:t>Por que </a:t>
+              <a:t>Quando u</a:t>
             </a:r>
             <a:r>
               <a:rPr lang="pt-BR" altLang="en-US"/>
-              <a:t>utilizando </a:t>
-            </a:r>
-            <a:r>
-              <a:rPr lang="pt-BR" altLang="en-US">
-                <a:sym typeface="+mn-ea"/>
-              </a:rPr>
-              <a:t>Delegação</a:t>
-            </a:r>
-            <a:r>
-              <a:rPr lang="en-US" altLang="pt-BR"/>
-              <a:t> </a:t>
-            </a:r>
-            <a:r>
-              <a:rPr lang="en-US" altLang="en-US"/>
-              <a:t>é</a:t>
-            </a:r>
-            <a:r>
-              <a:rPr lang="en-US" altLang="pt-BR"/>
-              <a:t> melhor?</a:t>
-            </a:r>
-            <a:endParaRPr lang="en-US" altLang="pt-BR"/>
+              <a:t>sar?</a:t>
+            </a:r>
+            <a:endParaRPr lang="pt-BR" altLang="en-US"/>
           </a:p>
         </p:txBody>
       </p:sp>
@@ -8735,7 +8704,17 @@
           <a:p>
             <a:r>
               <a:rPr lang="en-US" altLang="pt-BR"/>
-              <a:t>Escalabilidade: N</a:t>
+              <a:t>Listas ou tabelas com muitos itens.</a:t>
+            </a:r>
+            <a:endParaRPr lang="en-US" altLang="pt-BR"/>
+          </a:p>
+          <a:p>
+            <a:endParaRPr lang="en-US" altLang="pt-BR"/>
+          </a:p>
+          <a:p>
+            <a:r>
+              <a:rPr lang="en-US" altLang="pt-BR"/>
+              <a:t>Elementos que s</a:t>
             </a:r>
             <a:r>
               <a:rPr lang="en-US" altLang="en-US"/>
@@ -8743,66 +8722,32 @@
             </a:r>
             <a:r>
               <a:rPr lang="en-US" altLang="pt-BR"/>
-              <a:t>o importa quantos elementos li forem criados, o evento </a:t>
+              <a:t>o adicionados ou removidos dinamicamente ao DOM.</a:t>
+            </a:r>
+            <a:endParaRPr lang="en-US" altLang="pt-BR"/>
+          </a:p>
+          <a:p>
+            <a:endParaRPr lang="en-US" altLang="pt-BR"/>
+          </a:p>
+          <a:p>
+            <a:r>
+              <a:rPr lang="en-US" altLang="pt-BR"/>
+              <a:t>Sempre que quiser evitar m</a:t>
             </a:r>
             <a:r>
               <a:rPr lang="en-US" altLang="en-US"/>
-              <a:t>é</a:t>
-            </a:r>
-            <a:r>
-              <a:rPr lang="en-US" altLang="pt-BR"/>
-              <a:t> tratado pelo #lista.</a:t>
-            </a:r>
-            <a:endParaRPr lang="en-US" altLang="pt-BR"/>
-          </a:p>
-          <a:p>
-            <a:r>
-              <a:rPr lang="en-US" altLang="pt-BR"/>
-              <a:t>Performance: Apenas um manipulador </a:t>
-            </a:r>
-            <a:r>
-              <a:rPr lang="en-US" altLang="en-US"/>
-              <a:t>é</a:t>
-            </a:r>
-            <a:r>
-              <a:rPr lang="en-US" altLang="pt-BR"/>
-              <a:t> usado para todos os itens, em vez de criar um novo manipulador para cada item.</a:t>
-            </a:r>
-            <a:endParaRPr lang="en-US" altLang="pt-BR"/>
-          </a:p>
-          <a:p>
-            <a:r>
-              <a:rPr lang="en-US" altLang="pt-BR"/>
-              <a:t>Facilidade de manuten</a:t>
-            </a:r>
-            <a:r>
-              <a:rPr lang="en-US" altLang="en-US"/>
-              <a:t>ç</a:t>
-            </a:r>
-            <a:r>
-              <a:rPr lang="en-US" altLang="en-US"/>
-              <a:t>ã</a:t>
-            </a:r>
-            <a:r>
-              <a:rPr lang="en-US" altLang="pt-BR"/>
-              <a:t>o: O c</a:t>
-            </a:r>
-            <a:r>
-              <a:rPr lang="en-US" altLang="en-US"/>
-              <a:t>ó</a:t>
-            </a:r>
-            <a:r>
-              <a:rPr lang="en-US" altLang="pt-BR"/>
-              <a:t>digo </a:t>
-            </a:r>
-            <a:r>
-              <a:rPr lang="en-US" altLang="en-US"/>
-              <a:t>é</a:t>
-            </a:r>
-            <a:r>
-              <a:rPr lang="en-US" altLang="pt-BR"/>
-              <a:t> mais limpo e reduzido.</a:t>
-            </a:r>
+              <a:t>ú</a:t>
+            </a:r>
+            <a:r>
+              <a:rPr lang="en-US" altLang="pt-BR"/>
+              <a:t>ltiplos manipuladores de eventos no mesmo conjunto de elementos.</a:t>
+            </a:r>
+            <a:endParaRPr lang="en-US" altLang="pt-BR"/>
+          </a:p>
+          <a:p>
+            <a:pPr marL="0" indent="0">
+              <a:buNone/>
+            </a:pPr>
             <a:endParaRPr lang="en-US" altLang="pt-BR"/>
           </a:p>
         </p:txBody>
@@ -8827,7 +8772,7 @@
       <p:grpSpPr/>
       <p:sp>
         <p:nvSpPr>
-          <p:cNvPr id="2" name="Title 1"/>
+          <p:cNvPr id="2" name="Título 1"/>
           <p:cNvSpPr>
             <a:spLocks noGrp="1"/>
           </p:cNvSpPr>
@@ -8835,42 +8780,43 @@
             <p:ph type="title"/>
           </p:nvPr>
         </p:nvSpPr>
-        <p:spPr>
-          <a:xfrm>
-            <a:off x="457200" y="322580"/>
-            <a:ext cx="8229600" cy="582613"/>
-          </a:xfrm>
-        </p:spPr>
-        <p:txBody>
-          <a:bodyPr/>
-          <a:lstStyle/>
-          <a:p>
-            <a:r>
-              <a:t>Prática</a:t>
-            </a:r>
-            <a:r>
-              <a:rPr lang="pt-BR"/>
-              <a:t> - </a:t>
-            </a:r>
-            <a:r>
-              <a:rPr lang="en-US" altLang="pt-BR"/>
-              <a:t>Lista Din</a:t>
+        <p:spPr/>
+        <p:txBody>
+          <a:bodyPr/>
+          <a:p>
+            <a:r>
+              <a:rPr lang="en-US" altLang="pt-BR"/>
+              <a:t>Por que </a:t>
+            </a:r>
+            <a:r>
+              <a:rPr lang="pt-BR" altLang="en-US"/>
+              <a:t>utilizando </a:t>
+            </a:r>
+            <a:r>
+              <a:rPr lang="pt-BR" altLang="en-US">
+                <a:sym typeface="+mn-ea"/>
+              </a:rPr>
+              <a:t>Delegação</a:t>
+            </a:r>
+            <a:r>
+              <a:rPr lang="en-US" altLang="pt-BR"/>
+              <a:t> </a:t>
             </a:r>
             <a:r>
               <a:rPr lang="en-US" altLang="en-US"/>
-              <a:t>â</a:t>
-            </a:r>
-            <a:r>
-              <a:rPr lang="en-US" altLang="pt-BR"/>
-              <a:t>mica com Adicionar e Remover Itens</a:t>
-            </a:r>
-            <a:endParaRPr lang="en-US" altLang="pt-BR"/>
-          </a:p>
-        </p:txBody>
-      </p:sp>
-      <p:sp>
-        <p:nvSpPr>
-          <p:cNvPr id="3" name="Content Placeholder 2"/>
+              <a:t>é</a:t>
+            </a:r>
+            <a:r>
+              <a:rPr lang="en-US" altLang="pt-BR"/>
+              <a:t> melhor?</a:t>
+            </a:r>
+            <a:endParaRPr lang="en-US" altLang="pt-BR"/>
+          </a:p>
+        </p:txBody>
+      </p:sp>
+      <p:sp>
+        <p:nvSpPr>
+          <p:cNvPr id="3" name="Espaço Reservado para Conteúdo 2"/>
           <p:cNvSpPr>
             <a:spLocks noGrp="1"/>
           </p:cNvSpPr>
@@ -8878,48 +8824,81 @@
             <p:ph idx="1"/>
           </p:nvPr>
         </p:nvSpPr>
-        <p:spPr>
-          <a:xfrm>
-            <a:off x="457200" y="1606550"/>
-            <a:ext cx="8229600" cy="4953000"/>
-          </a:xfrm>
-        </p:spPr>
-        <p:txBody>
-          <a:bodyPr/>
-          <a:lstStyle/>
-          <a:p>
-            <a:pPr marL="0" indent="0">
-              <a:buNone/>
-            </a:pPr>
-            <a:r>
-              <a:t>1. Crie uma lista dinâmica onde os itens podem ser adicionados ou removidos.</a:t>
-            </a:r>
-          </a:p>
-          <a:p>
-            <a:pPr marL="0" indent="0">
-              <a:buNone/>
-            </a:pPr>
-          </a:p>
-          <a:p>
-            <a:pPr marL="0" indent="0">
-              <a:buNone/>
-            </a:pPr>
-            <a:r>
-              <a:t>2. Use `addEventListener` para capturar cliques nos botões de adicionar e remover.</a:t>
-            </a:r>
-          </a:p>
-          <a:p>
-            <a:pPr marL="0" indent="0">
-              <a:buNone/>
-            </a:pPr>
-          </a:p>
-          <a:p>
-            <a:pPr marL="0" indent="0">
-              <a:buNone/>
-            </a:pPr>
-            <a:r>
-              <a:t>3. Estilize os itens adicionados dinamicamente.</a:t>
-            </a:r>
+        <p:spPr/>
+        <p:txBody>
+          <a:bodyPr/>
+          <a:p>
+            <a:r>
+              <a:rPr lang="en-US" altLang="pt-BR"/>
+              <a:t>Escalabilidade: N</a:t>
+            </a:r>
+            <a:r>
+              <a:rPr lang="en-US" altLang="en-US"/>
+              <a:t>ã</a:t>
+            </a:r>
+            <a:r>
+              <a:rPr lang="en-US" altLang="pt-BR"/>
+              <a:t>o importa quantos elementos li forem criados, o evento </a:t>
+            </a:r>
+            <a:r>
+              <a:rPr lang="en-US" altLang="en-US"/>
+              <a:t>é</a:t>
+            </a:r>
+            <a:r>
+              <a:rPr lang="en-US" altLang="pt-BR"/>
+              <a:t> tratado pelo #lista.</a:t>
+            </a:r>
+            <a:endParaRPr lang="en-US" altLang="pt-BR"/>
+          </a:p>
+          <a:p>
+            <a:r>
+              <a:rPr lang="en-US" altLang="pt-BR"/>
+              <a:t>Performance: Apenas um manipulador </a:t>
+            </a:r>
+            <a:r>
+              <a:rPr lang="en-US" altLang="en-US"/>
+              <a:t>é</a:t>
+            </a:r>
+            <a:r>
+              <a:rPr lang="en-US" altLang="pt-BR"/>
+              <a:t> usado para todos os itens, em vez de criar um novo manipulador para cada item.</a:t>
+            </a:r>
+            <a:endParaRPr lang="en-US" altLang="pt-BR"/>
+          </a:p>
+          <a:p>
+            <a:r>
+              <a:rPr lang="en-US" altLang="pt-BR"/>
+              <a:t>Facilidade de manuten</a:t>
+            </a:r>
+            <a:r>
+              <a:rPr lang="en-US" altLang="en-US"/>
+              <a:t>ç</a:t>
+            </a:r>
+            <a:r>
+              <a:rPr lang="en-US" altLang="en-US"/>
+              <a:t>ã</a:t>
+            </a:r>
+            <a:r>
+              <a:rPr lang="en-US" altLang="pt-BR"/>
+              <a:t>o: O c</a:t>
+            </a:r>
+            <a:r>
+              <a:rPr lang="en-US" altLang="en-US"/>
+              <a:t>ó</a:t>
+            </a:r>
+            <a:r>
+              <a:rPr lang="en-US" altLang="pt-BR"/>
+              <a:t>digo </a:t>
+            </a:r>
+            <a:r>
+              <a:rPr lang="en-US" altLang="en-US"/>
+              <a:t>é</a:t>
+            </a:r>
+            <a:r>
+              <a:rPr lang="en-US" altLang="pt-BR"/>
+              <a:t> mais limpo e reduzido.</a:t>
+            </a:r>
+            <a:endParaRPr lang="en-US" altLang="pt-BR"/>
           </a:p>
         </p:txBody>
       </p:sp>
@@ -8943,7 +8922,7 @@
       <p:grpSpPr/>
       <p:sp>
         <p:nvSpPr>
-          <p:cNvPr id="2" name="Título 1"/>
+          <p:cNvPr id="2" name="Title 1"/>
           <p:cNvSpPr>
             <a:spLocks noGrp="1"/>
           </p:cNvSpPr>
@@ -8951,23 +8930,42 @@
             <p:ph type="title"/>
           </p:nvPr>
         </p:nvSpPr>
-        <p:spPr/>
-        <p:txBody>
-          <a:bodyPr/>
-          <a:p>
-            <a:r>
-              <a:rPr lang="en-US" altLang="pt-BR">
-                <a:sym typeface="+mn-ea"/>
-              </a:rPr>
-              <a:t>Passo a Passo</a:t>
-            </a:r>
-            <a:endParaRPr lang="pt-BR" altLang="en-US"/>
-          </a:p>
-        </p:txBody>
-      </p:sp>
-      <p:sp>
-        <p:nvSpPr>
-          <p:cNvPr id="3" name="Espaço Reservado para Conteúdo 2"/>
+        <p:spPr>
+          <a:xfrm>
+            <a:off x="457200" y="322580"/>
+            <a:ext cx="8229600" cy="582613"/>
+          </a:xfrm>
+        </p:spPr>
+        <p:txBody>
+          <a:bodyPr/>
+          <a:lstStyle/>
+          <a:p>
+            <a:r>
+              <a:t>Prática</a:t>
+            </a:r>
+            <a:r>
+              <a:rPr lang="pt-BR"/>
+              <a:t> - </a:t>
+            </a:r>
+            <a:r>
+              <a:rPr lang="en-US" altLang="pt-BR"/>
+              <a:t>Lista Din</a:t>
+            </a:r>
+            <a:r>
+              <a:rPr lang="en-US" altLang="en-US"/>
+              <a:t>â</a:t>
+            </a:r>
+            <a:r>
+              <a:rPr lang="en-US" altLang="pt-BR"/>
+              <a:t>mica com Adicionar e Remover Itens</a:t>
+            </a:r>
+            <a:endParaRPr lang="en-US" altLang="pt-BR"/>
+          </a:p>
+        </p:txBody>
+      </p:sp>
+      <p:sp>
+        <p:nvSpPr>
+          <p:cNvPr id="3" name="Content Placeholder 2"/>
           <p:cNvSpPr>
             <a:spLocks noGrp="1"/>
           </p:cNvSpPr>
@@ -8975,88 +8973,48 @@
             <p:ph idx="1"/>
           </p:nvPr>
         </p:nvSpPr>
-        <p:spPr/>
-        <p:txBody>
-          <a:bodyPr/>
-          <a:p>
-            <a:pPr marL="0" indent="0">
-              <a:buNone/>
-            </a:pPr>
-            <a:r>
-              <a:rPr lang="en-US" altLang="pt-BR"/>
-              <a:t>Estrutura HTML:</a:t>
-            </a:r>
-            <a:endParaRPr lang="en-US" altLang="pt-BR"/>
-          </a:p>
-          <a:p>
-            <a:pPr marL="0" indent="0">
-              <a:buNone/>
-            </a:pPr>
-            <a:endParaRPr lang="en-US" altLang="pt-BR"/>
-          </a:p>
-          <a:p>
-            <a:pPr marL="0" indent="0">
-              <a:buNone/>
-            </a:pPr>
-            <a:r>
-              <a:rPr lang="en-US" altLang="pt-BR"/>
-              <a:t>Um campo de entrada para adicionar o texto do item.</a:t>
-            </a:r>
-            <a:endParaRPr lang="en-US" altLang="pt-BR"/>
-          </a:p>
-          <a:p>
-            <a:pPr marL="0" indent="0">
-              <a:buNone/>
-            </a:pPr>
-            <a:endParaRPr lang="en-US" altLang="pt-BR"/>
-          </a:p>
-          <a:p>
-            <a:pPr marL="0" indent="0">
-              <a:buNone/>
-            </a:pPr>
-            <a:r>
-              <a:rPr lang="en-US" altLang="pt-BR"/>
-              <a:t>Um bot</a:t>
-            </a:r>
-            <a:r>
-              <a:rPr lang="en-US" altLang="en-US"/>
-              <a:t>ã</a:t>
-            </a:r>
-            <a:r>
-              <a:rPr lang="en-US" altLang="pt-BR"/>
-              <a:t>o para adicionar o item à lista.</a:t>
-            </a:r>
-            <a:endParaRPr lang="en-US" altLang="pt-BR"/>
-          </a:p>
-          <a:p>
-            <a:pPr marL="0" indent="0">
-              <a:buNone/>
-            </a:pPr>
-            <a:endParaRPr lang="en-US" altLang="pt-BR"/>
-          </a:p>
-          <a:p>
-            <a:pPr marL="0" indent="0">
-              <a:buNone/>
-            </a:pPr>
-            <a:r>
-              <a:rPr lang="en-US" altLang="pt-BR"/>
-              <a:t>Uma lista onde os itens ser</a:t>
-            </a:r>
-            <a:r>
-              <a:rPr lang="en-US" altLang="en-US"/>
-              <a:t>ã</a:t>
-            </a:r>
-            <a:r>
-              <a:rPr lang="en-US" altLang="pt-BR"/>
-              <a:t>o exibidos.</a:t>
-            </a:r>
-            <a:endParaRPr lang="en-US" altLang="pt-BR"/>
-          </a:p>
-          <a:p>
-            <a:pPr marL="0" indent="0">
-              <a:buNone/>
-            </a:pPr>
-            <a:endParaRPr lang="en-US" altLang="pt-BR"/>
+        <p:spPr>
+          <a:xfrm>
+            <a:off x="457200" y="1606550"/>
+            <a:ext cx="8229600" cy="4953000"/>
+          </a:xfrm>
+        </p:spPr>
+        <p:txBody>
+          <a:bodyPr/>
+          <a:lstStyle/>
+          <a:p>
+            <a:pPr marL="0" indent="0">
+              <a:buNone/>
+            </a:pPr>
+            <a:r>
+              <a:t>1. Crie uma lista dinâmica onde os itens podem ser adicionados ou removidos.</a:t>
+            </a:r>
+          </a:p>
+          <a:p>
+            <a:pPr marL="0" indent="0">
+              <a:buNone/>
+            </a:pPr>
+          </a:p>
+          <a:p>
+            <a:pPr marL="0" indent="0">
+              <a:buNone/>
+            </a:pPr>
+            <a:r>
+              <a:t>2. Use `addEventListener` para capturar cliques nos botões de adicionar e remover.</a:t>
+            </a:r>
+          </a:p>
+          <a:p>
+            <a:pPr marL="0" indent="0">
+              <a:buNone/>
+            </a:pPr>
+          </a:p>
+          <a:p>
+            <a:pPr marL="0" indent="0">
+              <a:buNone/>
+            </a:pPr>
+            <a:r>
+              <a:t>3. Estilize os itens adicionados dinamicamente.</a:t>
+            </a:r>
           </a:p>
         </p:txBody>
       </p:sp>
@@ -9120,84 +9078,72 @@
               <a:buNone/>
             </a:pPr>
             <a:r>
-              <a:rPr lang="en-US" altLang="pt-BR">
-                <a:sym typeface="+mn-ea"/>
-              </a:rPr>
-              <a:t>Estiliza</a:t>
-            </a:r>
-            <a:r>
-              <a:rPr lang="en-US" altLang="en-US">
-                <a:sym typeface="+mn-ea"/>
-              </a:rPr>
-              <a:t>çã</a:t>
-            </a:r>
-            <a:r>
-              <a:rPr lang="en-US" altLang="pt-BR">
-                <a:sym typeface="+mn-ea"/>
-              </a:rPr>
-              <a:t>o com CSS:</a:t>
-            </a:r>
-            <a:endParaRPr lang="en-US" altLang="pt-BR"/>
-          </a:p>
-          <a:p>
-            <a:pPr marL="0" indent="0">
-              <a:buNone/>
-            </a:pPr>
-            <a:endParaRPr lang="en-US" altLang="pt-BR"/>
-          </a:p>
-          <a:p>
-            <a:pPr marL="0" indent="0">
-              <a:buNone/>
-            </a:pPr>
-            <a:r>
-              <a:rPr lang="en-US" altLang="pt-BR">
-                <a:sym typeface="+mn-ea"/>
-              </a:rPr>
-              <a:t>Diferencie visualmente os itens da lista.</a:t>
-            </a:r>
-            <a:endParaRPr lang="en-US" altLang="pt-BR">
-              <a:sym typeface="+mn-ea"/>
-            </a:endParaRPr>
-          </a:p>
-          <a:p>
-            <a:pPr marL="0" indent="0">
-              <a:buNone/>
-            </a:pPr>
-            <a:endParaRPr lang="en-US" altLang="pt-BR"/>
-          </a:p>
-          <a:p>
-            <a:pPr marL="0" indent="0">
-              <a:buNone/>
-            </a:pPr>
-            <a:r>
-              <a:rPr lang="en-US" altLang="pt-BR">
-                <a:sym typeface="+mn-ea"/>
-              </a:rPr>
-              <a:t>Destaque os bot</a:t>
-            </a:r>
-            <a:r>
-              <a:rPr lang="en-US" altLang="en-US">
-                <a:sym typeface="+mn-ea"/>
-              </a:rPr>
-              <a:t>õ</a:t>
-            </a:r>
-            <a:r>
-              <a:rPr lang="en-US" altLang="pt-BR">
-                <a:sym typeface="+mn-ea"/>
-              </a:rPr>
-              <a:t>es de remo</a:t>
-            </a:r>
-            <a:r>
-              <a:rPr lang="en-US" altLang="en-US">
-                <a:sym typeface="+mn-ea"/>
-              </a:rPr>
-              <a:t>çã</a:t>
-            </a:r>
-            <a:r>
-              <a:rPr lang="en-US" altLang="pt-BR">
-                <a:sym typeface="+mn-ea"/>
-              </a:rPr>
-              <a:t>o com cores e efeitos ao passar o mouse.</a:t>
+              <a:rPr lang="en-US" altLang="pt-BR"/>
+              <a:t>Estrutura HTML:</a:t>
+            </a:r>
+            <a:endParaRPr lang="en-US" altLang="pt-BR"/>
+          </a:p>
+          <a:p>
+            <a:pPr marL="0" indent="0">
+              <a:buNone/>
+            </a:pPr>
+            <a:endParaRPr lang="en-US" altLang="pt-BR"/>
+          </a:p>
+          <a:p>
+            <a:pPr marL="0" indent="0">
+              <a:buNone/>
+            </a:pPr>
+            <a:r>
+              <a:rPr lang="en-US" altLang="pt-BR"/>
+              <a:t>Um campo de entrada para adicionar o texto do item.</a:t>
+            </a:r>
+            <a:endParaRPr lang="en-US" altLang="pt-BR"/>
+          </a:p>
+          <a:p>
+            <a:pPr marL="0" indent="0">
+              <a:buNone/>
+            </a:pPr>
+            <a:endParaRPr lang="en-US" altLang="pt-BR"/>
+          </a:p>
+          <a:p>
+            <a:pPr marL="0" indent="0">
+              <a:buNone/>
+            </a:pPr>
+            <a:r>
+              <a:rPr lang="en-US" altLang="pt-BR"/>
+              <a:t>Um bot</a:t>
+            </a:r>
+            <a:r>
+              <a:rPr lang="en-US" altLang="en-US"/>
+              <a:t>ã</a:t>
+            </a:r>
+            <a:r>
+              <a:rPr lang="en-US" altLang="pt-BR"/>
+              <a:t>o para adicionar o item à lista.</a:t>
+            </a:r>
+            <a:endParaRPr lang="en-US" altLang="pt-BR"/>
+          </a:p>
+          <a:p>
+            <a:pPr marL="0" indent="0">
+              <a:buNone/>
+            </a:pPr>
+            <a:endParaRPr lang="en-US" altLang="pt-BR"/>
+          </a:p>
+          <a:p>
+            <a:pPr marL="0" indent="0">
+              <a:buNone/>
+            </a:pPr>
+            <a:r>
+              <a:rPr lang="en-US" altLang="pt-BR"/>
+              <a:t>Uma lista onde os itens ser</a:t>
+            </a:r>
+            <a:r>
+              <a:rPr lang="en-US" altLang="en-US"/>
+              <a:t>ã</a:t>
+            </a:r>
+            <a:r>
+              <a:rPr lang="en-US" altLang="pt-BR"/>
+              <a:t>o exibidos.</a:t>
             </a:r>
             <a:endParaRPr lang="en-US" altLang="pt-BR"/>
           </a:p>
@@ -9218,6 +9164,155 @@
 </file>
 
 <file path=ppt/slides/slide35.xml><?xml version="1.0" encoding="utf-8"?>
+<p:sld xmlns:a="http://schemas.openxmlformats.org/drawingml/2006/main" xmlns:r="http://schemas.openxmlformats.org/officeDocument/2006/relationships" xmlns:p="http://schemas.openxmlformats.org/presentationml/2006/main">
+  <p:cSld>
+    <p:spTree>
+      <p:nvGrpSpPr>
+        <p:cNvPr id="1" name=""/>
+        <p:cNvGrpSpPr/>
+        <p:nvPr/>
+      </p:nvGrpSpPr>
+      <p:grpSpPr/>
+      <p:sp>
+        <p:nvSpPr>
+          <p:cNvPr id="2" name="Título 1"/>
+          <p:cNvSpPr>
+            <a:spLocks noGrp="1"/>
+          </p:cNvSpPr>
+          <p:nvPr>
+            <p:ph type="title"/>
+          </p:nvPr>
+        </p:nvSpPr>
+        <p:spPr/>
+        <p:txBody>
+          <a:bodyPr/>
+          <a:p>
+            <a:r>
+              <a:rPr lang="en-US" altLang="pt-BR">
+                <a:sym typeface="+mn-ea"/>
+              </a:rPr>
+              <a:t>Passo a Passo</a:t>
+            </a:r>
+            <a:endParaRPr lang="pt-BR" altLang="en-US"/>
+          </a:p>
+        </p:txBody>
+      </p:sp>
+      <p:sp>
+        <p:nvSpPr>
+          <p:cNvPr id="3" name="Espaço Reservado para Conteúdo 2"/>
+          <p:cNvSpPr>
+            <a:spLocks noGrp="1"/>
+          </p:cNvSpPr>
+          <p:nvPr>
+            <p:ph idx="1"/>
+          </p:nvPr>
+        </p:nvSpPr>
+        <p:spPr/>
+        <p:txBody>
+          <a:bodyPr/>
+          <a:p>
+            <a:pPr marL="0" indent="0">
+              <a:buNone/>
+            </a:pPr>
+            <a:r>
+              <a:rPr lang="en-US" altLang="pt-BR">
+                <a:sym typeface="+mn-ea"/>
+              </a:rPr>
+              <a:t>Estiliza</a:t>
+            </a:r>
+            <a:r>
+              <a:rPr lang="en-US" altLang="en-US">
+                <a:sym typeface="+mn-ea"/>
+              </a:rPr>
+              <a:t>çã</a:t>
+            </a:r>
+            <a:r>
+              <a:rPr lang="en-US" altLang="pt-BR">
+                <a:sym typeface="+mn-ea"/>
+              </a:rPr>
+              <a:t>o com CSS:</a:t>
+            </a:r>
+            <a:endParaRPr lang="en-US" altLang="pt-BR"/>
+          </a:p>
+          <a:p>
+            <a:pPr marL="0" indent="0">
+              <a:buNone/>
+            </a:pPr>
+            <a:endParaRPr lang="en-US" altLang="pt-BR"/>
+          </a:p>
+          <a:p>
+            <a:pPr marL="0" indent="0">
+              <a:buNone/>
+            </a:pPr>
+            <a:r>
+              <a:rPr lang="en-US" altLang="pt-BR">
+                <a:sym typeface="+mn-ea"/>
+              </a:rPr>
+              <a:t>Diferencie visualmente os itens da lista.</a:t>
+            </a:r>
+            <a:endParaRPr lang="en-US" altLang="pt-BR">
+              <a:sym typeface="+mn-ea"/>
+            </a:endParaRPr>
+          </a:p>
+          <a:p>
+            <a:pPr marL="0" indent="0">
+              <a:buNone/>
+            </a:pPr>
+            <a:endParaRPr lang="en-US" altLang="pt-BR"/>
+          </a:p>
+          <a:p>
+            <a:pPr marL="0" indent="0">
+              <a:buNone/>
+            </a:pPr>
+            <a:r>
+              <a:rPr lang="en-US" altLang="pt-BR">
+                <a:sym typeface="+mn-ea"/>
+              </a:rPr>
+              <a:t>Destaque os bot</a:t>
+            </a:r>
+            <a:r>
+              <a:rPr lang="en-US" altLang="en-US">
+                <a:sym typeface="+mn-ea"/>
+              </a:rPr>
+              <a:t>õ</a:t>
+            </a:r>
+            <a:r>
+              <a:rPr lang="en-US" altLang="pt-BR">
+                <a:sym typeface="+mn-ea"/>
+              </a:rPr>
+              <a:t>es de remo</a:t>
+            </a:r>
+            <a:r>
+              <a:rPr lang="en-US" altLang="en-US">
+                <a:sym typeface="+mn-ea"/>
+              </a:rPr>
+              <a:t>çã</a:t>
+            </a:r>
+            <a:r>
+              <a:rPr lang="en-US" altLang="pt-BR">
+                <a:sym typeface="+mn-ea"/>
+              </a:rPr>
+              <a:t>o com cores e efeitos ao passar o mouse.</a:t>
+            </a:r>
+            <a:endParaRPr lang="en-US" altLang="pt-BR"/>
+          </a:p>
+          <a:p>
+            <a:pPr marL="0" indent="0">
+              <a:buNone/>
+            </a:pPr>
+            <a:endParaRPr lang="en-US" altLang="pt-BR"/>
+          </a:p>
+        </p:txBody>
+      </p:sp>
+    </p:spTree>
+  </p:cSld>
+  <p:clrMapOvr>
+    <a:masterClrMapping/>
+  </p:clrMapOvr>
+</p:sld>
+</file>
+
+<file path=ppt/slides/slide36.xml><?xml version="1.0" encoding="utf-8"?>
 <p:sld xmlns:a="http://schemas.openxmlformats.org/drawingml/2006/main" xmlns:r="http://schemas.openxmlformats.org/officeDocument/2006/relationships" xmlns:p="http://schemas.openxmlformats.org/presentationml/2006/main">
   <p:cSld>
     <p:spTree>

</xml_diff>